<commit_message>
Added Silent Printing Using a new exe can print silently Using relative locations now aswell
</commit_message>
<xml_diff>
--- a/LabelSerialNumberOverview.pptx
+++ b/LabelSerialNumberOverview.pptx
@@ -14862,7 +14862,7 @@
             <a:fld id="{5586B75A-687E-405C-8A0B-8D00578BA2C3}" type="datetimeFigureOut">
               <a:rPr lang="en-US" dirty="0"/>
               <a:pPr/>
-              <a:t>9/28/2021</a:t>
+              <a:t>9/30/2021</a:t>
             </a:fld>
             <a:endParaRPr lang="en-US" dirty="0"/>
           </a:p>
@@ -15029,7 +15029,7 @@
             <a:fld id="{5586B75A-687E-405C-8A0B-8D00578BA2C3}" type="datetimeFigureOut">
               <a:rPr lang="en-US" dirty="0"/>
               <a:pPr/>
-              <a:t>9/28/2021</a:t>
+              <a:t>9/30/2021</a:t>
             </a:fld>
             <a:endParaRPr lang="en-US" dirty="0"/>
           </a:p>
@@ -15206,7 +15206,7 @@
             <a:fld id="{5586B75A-687E-405C-8A0B-8D00578BA2C3}" type="datetimeFigureOut">
               <a:rPr lang="en-US" dirty="0"/>
               <a:pPr/>
-              <a:t>9/28/2021</a:t>
+              <a:t>9/30/2021</a:t>
             </a:fld>
             <a:endParaRPr lang="en-US" dirty="0"/>
           </a:p>
@@ -15373,7 +15373,7 @@
             <a:fld id="{5586B75A-687E-405C-8A0B-8D00578BA2C3}" type="datetimeFigureOut">
               <a:rPr lang="en-US" dirty="0"/>
               <a:pPr/>
-              <a:t>9/28/2021</a:t>
+              <a:t>9/30/2021</a:t>
             </a:fld>
             <a:endParaRPr lang="en-US" dirty="0"/>
           </a:p>
@@ -15628,7 +15628,7 @@
             <a:fld id="{5586B75A-687E-405C-8A0B-8D00578BA2C3}" type="datetimeFigureOut">
               <a:rPr lang="en-US" dirty="0"/>
               <a:pPr/>
-              <a:t>9/28/2021</a:t>
+              <a:t>9/30/2021</a:t>
             </a:fld>
             <a:endParaRPr lang="en-US" dirty="0"/>
           </a:p>
@@ -15913,7 +15913,7 @@
             <a:fld id="{5586B75A-687E-405C-8A0B-8D00578BA2C3}" type="datetimeFigureOut">
               <a:rPr lang="en-US" dirty="0"/>
               <a:pPr/>
-              <a:t>9/28/2021</a:t>
+              <a:t>9/30/2021</a:t>
             </a:fld>
             <a:endParaRPr lang="en-US" dirty="0"/>
           </a:p>
@@ -16352,7 +16352,7 @@
             <a:fld id="{5586B75A-687E-405C-8A0B-8D00578BA2C3}" type="datetimeFigureOut">
               <a:rPr lang="en-US" dirty="0"/>
               <a:pPr/>
-              <a:t>9/28/2021</a:t>
+              <a:t>9/30/2021</a:t>
             </a:fld>
             <a:endParaRPr lang="en-US" dirty="0"/>
           </a:p>
@@ -16467,7 +16467,7 @@
             <a:fld id="{5586B75A-687E-405C-8A0B-8D00578BA2C3}" type="datetimeFigureOut">
               <a:rPr lang="en-US" dirty="0"/>
               <a:pPr/>
-              <a:t>9/28/2021</a:t>
+              <a:t>9/30/2021</a:t>
             </a:fld>
             <a:endParaRPr lang="en-US" dirty="0"/>
           </a:p>
@@ -16559,7 +16559,7 @@
             <a:fld id="{5586B75A-687E-405C-8A0B-8D00578BA2C3}" type="datetimeFigureOut">
               <a:rPr lang="en-US" dirty="0"/>
               <a:pPr/>
-              <a:t>9/28/2021</a:t>
+              <a:t>9/30/2021</a:t>
             </a:fld>
             <a:endParaRPr lang="en-US" dirty="0"/>
           </a:p>
@@ -16844,7 +16844,7 @@
             <a:fld id="{5586B75A-687E-405C-8A0B-8D00578BA2C3}" type="datetimeFigureOut">
               <a:rPr lang="en-US" dirty="0"/>
               <a:pPr/>
-              <a:t>9/28/2021</a:t>
+              <a:t>9/30/2021</a:t>
             </a:fld>
             <a:endParaRPr lang="en-US" dirty="0"/>
           </a:p>
@@ -17114,7 +17114,7 @@
             <a:fld id="{5586B75A-687E-405C-8A0B-8D00578BA2C3}" type="datetimeFigureOut">
               <a:rPr lang="en-US" dirty="0"/>
               <a:pPr/>
-              <a:t>9/28/2021</a:t>
+              <a:t>9/30/2021</a:t>
             </a:fld>
             <a:endParaRPr lang="en-US" dirty="0"/>
           </a:p>
@@ -17408,7 +17408,7 @@
             <a:fld id="{5586B75A-687E-405C-8A0B-8D00578BA2C3}" type="datetimeFigureOut">
               <a:rPr lang="en-US" dirty="0"/>
               <a:pPr/>
-              <a:t>9/28/2021</a:t>
+              <a:t>9/30/2021</a:t>
             </a:fld>
             <a:endParaRPr lang="en-US" dirty="0"/>
           </a:p>
@@ -18605,7 +18605,7 @@
         <p:spPr/>
         <p:txBody>
           <a:bodyPr>
-            <a:normAutofit fontScale="92500" lnSpcReduction="20000"/>
+            <a:normAutofit fontScale="92500" lnSpcReduction="10000"/>
           </a:bodyPr>
           <a:lstStyle/>
           <a:p>
@@ -18684,12 +18684,6 @@
             <a:r>
               <a:rPr lang="en-US" dirty="0"/>
               <a:t>And recompiled</a:t>
-            </a:r>
-          </a:p>
-          <a:p>
-            <a:r>
-              <a:rPr lang="en-US" dirty="0"/>
-              <a:t>Install SQL Server 2019 for SQLCMD.EXE</a:t>
             </a:r>
           </a:p>
           <a:p>
@@ -18817,7 +18811,15 @@
           <a:p>
             <a:r>
               <a:rPr lang="en-US" dirty="0"/>
-              <a:t>Report extract is impossible to work with</a:t>
+              <a:t>Report extract from </a:t>
+            </a:r>
+            <a:r>
+              <a:rPr lang="en-US" dirty="0" err="1"/>
+              <a:t>ExactMAX</a:t>
+            </a:r>
+            <a:r>
+              <a:rPr lang="en-US" dirty="0"/>
+              <a:t> is impossible to work with</a:t>
             </a:r>
           </a:p>
           <a:p>
@@ -18836,13 +18838,13 @@
           <a:p>
             <a:r>
               <a:rPr lang="en-US" dirty="0"/>
-              <a:t>Ensure Adobe Acrobat and Microsoft Word is installed</a:t>
+              <a:t>Ensure Microsoft Word is installed</a:t>
             </a:r>
           </a:p>
           <a:p>
             <a:r>
               <a:rPr lang="en-US" dirty="0"/>
-              <a:t>Adobe Acrobat can’t print silently</a:t>
+              <a:t>Install SQL Server 2019 for SQLCMD.EXE</a:t>
             </a:r>
           </a:p>
           <a:p>
@@ -19131,7 +19133,7 @@
           <a:p>
             <a:r>
               <a:rPr lang="en-US" dirty="0"/>
-              <a:t>The Label Serial Number Project is intended to streamline the printing document/label process </a:t>
+              <a:t>The Label Serial Number Project is intended to streamline the printing document/label process for construction </a:t>
             </a:r>
             <a:r>
               <a:rPr lang="fr-CA" dirty="0"/>
@@ -19143,7 +19145,7 @@
             </a:r>
             <a:r>
               <a:rPr lang="fr-CA" dirty="0"/>
-              <a:t> </a:t>
+              <a:t> at the time </a:t>
             </a:r>
             <a:r>
               <a:rPr lang="fr-CA" dirty="0" err="1"/>
@@ -19194,11 +19196,11 @@
             </a:r>
             <a:r>
               <a:rPr lang="fr-CA" dirty="0"/>
-              <a:t> deal </a:t>
+              <a:t> </a:t>
             </a:r>
             <a:r>
               <a:rPr lang="fr-CA" dirty="0" err="1"/>
-              <a:t>with</a:t>
+              <a:t>handle</a:t>
             </a:r>
             <a:r>
               <a:rPr lang="fr-CA" dirty="0"/>
@@ -19231,6 +19233,46 @@
             <a:r>
               <a:rPr lang="fr-CA" dirty="0" err="1"/>
               <a:t>needed</a:t>
+            </a:r>
+            <a:r>
+              <a:rPr lang="fr-CA" dirty="0"/>
+              <a:t> </a:t>
+            </a:r>
+            <a:r>
+              <a:rPr lang="fr-CA" dirty="0" err="1"/>
+              <a:t>based</a:t>
+            </a:r>
+            <a:r>
+              <a:rPr lang="fr-CA" dirty="0"/>
+              <a:t> on serial </a:t>
+            </a:r>
+            <a:r>
+              <a:rPr lang="fr-CA" dirty="0" err="1"/>
+              <a:t>numbers</a:t>
+            </a:r>
+            <a:r>
+              <a:rPr lang="fr-CA" dirty="0"/>
+              <a:t> </a:t>
+            </a:r>
+            <a:r>
+              <a:rPr lang="fr-CA" dirty="0" err="1"/>
+              <a:t>given</a:t>
+            </a:r>
+            <a:r>
+              <a:rPr lang="fr-CA" dirty="0"/>
+              <a:t> out, the </a:t>
+            </a:r>
+            <a:r>
+              <a:rPr lang="fr-CA" dirty="0" err="1"/>
+              <a:t>week</a:t>
+            </a:r>
+            <a:r>
+              <a:rPr lang="fr-CA" dirty="0"/>
+              <a:t>, and the </a:t>
+            </a:r>
+            <a:r>
+              <a:rPr lang="fr-CA" dirty="0" err="1"/>
+              <a:t>year</a:t>
             </a:r>
             <a:endParaRPr lang="fr-CA" dirty="0"/>
           </a:p>
@@ -19289,9 +19331,26 @@
             </a:r>
           </a:p>
           <a:p>
+            <a:pPr lvl="1"/>
             <a:r>
               <a:rPr lang="fr-CA" dirty="0"/>
-              <a:t>Follow the basic instructions on screen to </a:t>
+              <a:t>A </a:t>
+            </a:r>
+            <a:r>
+              <a:rPr lang="fr-CA" dirty="0" err="1"/>
+              <a:t>manual</a:t>
+            </a:r>
+            <a:r>
+              <a:rPr lang="fr-CA" dirty="0"/>
+              <a:t> shop </a:t>
+            </a:r>
+            <a:r>
+              <a:rPr lang="fr-CA" dirty="0" err="1"/>
+              <a:t>order</a:t>
+            </a:r>
+            <a:r>
+              <a:rPr lang="fr-CA" dirty="0"/>
+              <a:t> </a:t>
             </a:r>
             <a:r>
               <a:rPr lang="fr-CA" dirty="0" err="1"/>
@@ -19299,6 +19358,76 @@
             </a:r>
             <a:r>
               <a:rPr lang="fr-CA" dirty="0"/>
+              <a:t> can </a:t>
+            </a:r>
+            <a:r>
+              <a:rPr lang="fr-CA" dirty="0" err="1"/>
+              <a:t>be</a:t>
+            </a:r>
+            <a:r>
+              <a:rPr lang="fr-CA" dirty="0"/>
+              <a:t> </a:t>
+            </a:r>
+            <a:r>
+              <a:rPr lang="fr-CA" dirty="0" err="1"/>
+              <a:t>executed</a:t>
+            </a:r>
+            <a:r>
+              <a:rPr lang="fr-CA" dirty="0"/>
+              <a:t> by pressing F9, </a:t>
+            </a:r>
+            <a:r>
+              <a:rPr lang="fr-CA" dirty="0" err="1"/>
+              <a:t>typing</a:t>
+            </a:r>
+            <a:r>
+              <a:rPr lang="fr-CA" dirty="0"/>
+              <a:t> the shop </a:t>
+            </a:r>
+            <a:r>
+              <a:rPr lang="fr-CA" dirty="0" err="1"/>
+              <a:t>order</a:t>
+            </a:r>
+            <a:r>
+              <a:rPr lang="fr-CA" dirty="0"/>
+              <a:t> out, </a:t>
+            </a:r>
+            <a:r>
+              <a:rPr lang="fr-CA" dirty="0" err="1"/>
+              <a:t>then</a:t>
+            </a:r>
+            <a:r>
+              <a:rPr lang="fr-CA" dirty="0"/>
+              <a:t> pressing Enter/</a:t>
+            </a:r>
+            <a:r>
+              <a:rPr lang="fr-CA" dirty="0" err="1"/>
+              <a:t>Carriage</a:t>
+            </a:r>
+            <a:r>
+              <a:rPr lang="fr-CA" dirty="0"/>
+              <a:t> Return</a:t>
+            </a:r>
+          </a:p>
+          <a:p>
+            <a:r>
+              <a:rPr lang="fr-CA" dirty="0"/>
+              <a:t>Follow the instructions on the command prompt </a:t>
+            </a:r>
+            <a:r>
+              <a:rPr lang="fr-CA" dirty="0" err="1"/>
+              <a:t>window</a:t>
+            </a:r>
+            <a:r>
+              <a:rPr lang="fr-CA" dirty="0"/>
+              <a:t> to </a:t>
+            </a:r>
+            <a:r>
+              <a:rPr lang="fr-CA" dirty="0" err="1"/>
+              <a:t>print</a:t>
+            </a:r>
+            <a:r>
+              <a:rPr lang="fr-CA" dirty="0"/>
               <a:t> the </a:t>
             </a:r>
             <a:r>
@@ -19307,7 +19436,7 @@
             </a:r>
             <a:r>
               <a:rPr lang="fr-CA" dirty="0"/>
-              <a:t> documents</a:t>
+              <a:t> documents/labels</a:t>
             </a:r>
             <a:endParaRPr lang="en-US" dirty="0"/>
           </a:p>

</xml_diff>

<commit_message>
Updated Docs, Display Wording, Few Errors Updated PPT, PDF, ReadMe Changed some wording on the display to be more clear Fixed Word doc printing, possible path name with spaces fix
</commit_message>
<xml_diff>
--- a/LabelSerialNumberOverview.pptx
+++ b/LabelSerialNumberOverview.pptx
@@ -12,20 +12,21 @@
     <p:sldId id="284" r:id="rId6"/>
     <p:sldId id="279" r:id="rId7"/>
     <p:sldId id="272" r:id="rId8"/>
-    <p:sldId id="280" r:id="rId9"/>
-    <p:sldId id="271" r:id="rId10"/>
-    <p:sldId id="290" r:id="rId11"/>
-    <p:sldId id="286" r:id="rId12"/>
-    <p:sldId id="259" r:id="rId13"/>
-    <p:sldId id="287" r:id="rId14"/>
-    <p:sldId id="257" r:id="rId15"/>
-    <p:sldId id="260" r:id="rId16"/>
-    <p:sldId id="261" r:id="rId17"/>
-    <p:sldId id="264" r:id="rId18"/>
-    <p:sldId id="288" r:id="rId19"/>
-    <p:sldId id="289" r:id="rId20"/>
-    <p:sldId id="263" r:id="rId21"/>
-    <p:sldId id="262" r:id="rId22"/>
+    <p:sldId id="291" r:id="rId9"/>
+    <p:sldId id="280" r:id="rId10"/>
+    <p:sldId id="271" r:id="rId11"/>
+    <p:sldId id="288" r:id="rId12"/>
+    <p:sldId id="289" r:id="rId13"/>
+    <p:sldId id="290" r:id="rId14"/>
+    <p:sldId id="286" r:id="rId15"/>
+    <p:sldId id="259" r:id="rId16"/>
+    <p:sldId id="287" r:id="rId17"/>
+    <p:sldId id="257" r:id="rId18"/>
+    <p:sldId id="260" r:id="rId19"/>
+    <p:sldId id="261" r:id="rId20"/>
+    <p:sldId id="264" r:id="rId21"/>
+    <p:sldId id="263" r:id="rId22"/>
+    <p:sldId id="262" r:id="rId23"/>
   </p:sldIdLst>
   <p:sldSz cx="12192000" cy="6858000"/>
   <p:notesSz cx="6858000" cy="9144000"/>
@@ -18207,7 +18208,7 @@
             <a:fld id="{5586B75A-687E-405C-8A0B-8D00578BA2C3}" type="datetimeFigureOut">
               <a:rPr lang="en-US"/>
               <a:pPr/>
-              <a:t>10/25/2021</a:t>
+              <a:t>10/26/2021</a:t>
             </a:fld>
             <a:endParaRPr lang="en-US"/>
           </a:p>
@@ -18374,7 +18375,7 @@
             <a:fld id="{5586B75A-687E-405C-8A0B-8D00578BA2C3}" type="datetimeFigureOut">
               <a:rPr lang="en-US"/>
               <a:pPr/>
-              <a:t>10/25/2021</a:t>
+              <a:t>10/26/2021</a:t>
             </a:fld>
             <a:endParaRPr lang="en-US"/>
           </a:p>
@@ -18551,7 +18552,7 @@
             <a:fld id="{5586B75A-687E-405C-8A0B-8D00578BA2C3}" type="datetimeFigureOut">
               <a:rPr lang="en-US"/>
               <a:pPr/>
-              <a:t>10/25/2021</a:t>
+              <a:t>10/26/2021</a:t>
             </a:fld>
             <a:endParaRPr lang="en-US"/>
           </a:p>
@@ -18718,7 +18719,7 @@
             <a:fld id="{5586B75A-687E-405C-8A0B-8D00578BA2C3}" type="datetimeFigureOut">
               <a:rPr lang="en-US"/>
               <a:pPr/>
-              <a:t>10/25/2021</a:t>
+              <a:t>10/26/2021</a:t>
             </a:fld>
             <a:endParaRPr lang="en-US"/>
           </a:p>
@@ -18973,7 +18974,7 @@
             <a:fld id="{5586B75A-687E-405C-8A0B-8D00578BA2C3}" type="datetimeFigureOut">
               <a:rPr lang="en-US"/>
               <a:pPr/>
-              <a:t>10/25/2021</a:t>
+              <a:t>10/26/2021</a:t>
             </a:fld>
             <a:endParaRPr lang="en-US"/>
           </a:p>
@@ -19258,7 +19259,7 @@
             <a:fld id="{5586B75A-687E-405C-8A0B-8D00578BA2C3}" type="datetimeFigureOut">
               <a:rPr lang="en-US"/>
               <a:pPr/>
-              <a:t>10/25/2021</a:t>
+              <a:t>10/26/2021</a:t>
             </a:fld>
             <a:endParaRPr lang="en-US"/>
           </a:p>
@@ -19697,7 +19698,7 @@
             <a:fld id="{5586B75A-687E-405C-8A0B-8D00578BA2C3}" type="datetimeFigureOut">
               <a:rPr lang="en-US"/>
               <a:pPr/>
-              <a:t>10/25/2021</a:t>
+              <a:t>10/26/2021</a:t>
             </a:fld>
             <a:endParaRPr lang="en-US"/>
           </a:p>
@@ -19812,7 +19813,7 @@
             <a:fld id="{5586B75A-687E-405C-8A0B-8D00578BA2C3}" type="datetimeFigureOut">
               <a:rPr lang="en-US"/>
               <a:pPr/>
-              <a:t>10/25/2021</a:t>
+              <a:t>10/26/2021</a:t>
             </a:fld>
             <a:endParaRPr lang="en-US"/>
           </a:p>
@@ -19904,7 +19905,7 @@
             <a:fld id="{5586B75A-687E-405C-8A0B-8D00578BA2C3}" type="datetimeFigureOut">
               <a:rPr lang="en-US"/>
               <a:pPr/>
-              <a:t>10/25/2021</a:t>
+              <a:t>10/26/2021</a:t>
             </a:fld>
             <a:endParaRPr lang="en-US"/>
           </a:p>
@@ -20189,7 +20190,7 @@
             <a:fld id="{5586B75A-687E-405C-8A0B-8D00578BA2C3}" type="datetimeFigureOut">
               <a:rPr lang="en-US"/>
               <a:pPr/>
-              <a:t>10/25/2021</a:t>
+              <a:t>10/26/2021</a:t>
             </a:fld>
             <a:endParaRPr lang="en-US"/>
           </a:p>
@@ -20458,7 +20459,7 @@
             <a:fld id="{5586B75A-687E-405C-8A0B-8D00578BA2C3}" type="datetimeFigureOut">
               <a:rPr lang="en-US"/>
               <a:pPr/>
-              <a:t>10/25/2021</a:t>
+              <a:t>10/26/2021</a:t>
             </a:fld>
             <a:endParaRPr lang="en-US"/>
           </a:p>
@@ -20752,7 +20753,7 @@
             <a:fld id="{5586B75A-687E-405C-8A0B-8D00578BA2C3}" type="datetimeFigureOut">
               <a:rPr lang="en-US"/>
               <a:pPr/>
-              <a:t>10/25/2021</a:t>
+              <a:t>10/26/2021</a:t>
             </a:fld>
             <a:endParaRPr lang="en-US"/>
           </a:p>
@@ -21340,6 +21341,614 @@
           <p:cNvPr id="2" name="Title 1">
             <a:extLst>
               <a:ext uri="{FF2B5EF4-FFF2-40B4-BE49-F238E27FC236}">
+                <a16:creationId xmlns:a16="http://schemas.microsoft.com/office/drawing/2014/main" id="{61179D2D-801C-4EE8-A452-FEEBAB97827A}"/>
+              </a:ext>
+            </a:extLst>
+          </p:cNvPr>
+          <p:cNvSpPr>
+            <a:spLocks noGrp="1"/>
+          </p:cNvSpPr>
+          <p:nvPr>
+            <p:ph type="title"/>
+          </p:nvPr>
+        </p:nvSpPr>
+        <p:spPr/>
+        <p:txBody>
+          <a:bodyPr/>
+          <a:lstStyle/>
+          <a:p>
+            <a:r>
+              <a:rPr lang="en-US"/>
+              <a:t>Post Printing Stage 2</a:t>
+            </a:r>
+            <a:endParaRPr lang="fr-CA"/>
+          </a:p>
+        </p:txBody>
+      </p:sp>
+      <p:sp>
+        <p:nvSpPr>
+          <p:cNvPr id="4" name="Text Placeholder 3">
+            <a:extLst>
+              <a:ext uri="{FF2B5EF4-FFF2-40B4-BE49-F238E27FC236}">
+                <a16:creationId xmlns:a16="http://schemas.microsoft.com/office/drawing/2014/main" id="{6C4C9579-17E8-4B90-A0AC-8E6A0551F6C7}"/>
+              </a:ext>
+            </a:extLst>
+          </p:cNvPr>
+          <p:cNvSpPr>
+            <a:spLocks noGrp="1"/>
+          </p:cNvSpPr>
+          <p:nvPr>
+            <p:ph type="body" sz="half" idx="2"/>
+          </p:nvPr>
+        </p:nvSpPr>
+        <p:spPr/>
+        <p:txBody>
+          <a:bodyPr/>
+          <a:lstStyle/>
+          <a:p>
+            <a:endParaRPr lang="fr-CA"/>
+          </a:p>
+        </p:txBody>
+      </p:sp>
+      <p:pic>
+        <p:nvPicPr>
+          <p:cNvPr id="7" name="Picture 6">
+            <a:extLst>
+              <a:ext uri="{FF2B5EF4-FFF2-40B4-BE49-F238E27FC236}">
+                <a16:creationId xmlns:a16="http://schemas.microsoft.com/office/drawing/2014/main" id="{12065F72-E859-4CC5-B874-43111899779C}"/>
+              </a:ext>
+            </a:extLst>
+          </p:cNvPr>
+          <p:cNvPicPr>
+            <a:picLocks noChangeAspect="1"/>
+          </p:cNvPicPr>
+          <p:nvPr/>
+        </p:nvPicPr>
+        <p:blipFill>
+          <a:blip r:embed="rId2"/>
+          <a:stretch>
+            <a:fillRect/>
+          </a:stretch>
+        </p:blipFill>
+        <p:spPr>
+          <a:xfrm>
+            <a:off x="3579199" y="1316168"/>
+            <a:ext cx="8079931" cy="4225663"/>
+          </a:xfrm>
+          <a:prstGeom prst="rect">
+            <a:avLst/>
+          </a:prstGeom>
+        </p:spPr>
+      </p:pic>
+    </p:spTree>
+    <p:extLst>
+      <p:ext uri="{BB962C8B-B14F-4D97-AF65-F5344CB8AC3E}">
+        <p14:creationId xmlns:p14="http://schemas.microsoft.com/office/powerpoint/2010/main" val="4089766087"/>
+      </p:ext>
+    </p:extLst>
+  </p:cSld>
+  <p:clrMapOvr>
+    <a:masterClrMapping/>
+  </p:clrMapOvr>
+</p:sld>
+</file>
+
+<file path=ppt/slides/slide11.xml><?xml version="1.0" encoding="utf-8"?>
+<p:sld xmlns:a="http://schemas.openxmlformats.org/drawingml/2006/main" xmlns:r="http://schemas.openxmlformats.org/officeDocument/2006/relationships" xmlns:p="http://schemas.openxmlformats.org/presentationml/2006/main">
+  <p:cSld>
+    <p:spTree>
+      <p:nvGrpSpPr>
+        <p:cNvPr id="1" name=""/>
+        <p:cNvGrpSpPr/>
+        <p:nvPr/>
+      </p:nvGrpSpPr>
+      <p:grpSpPr>
+        <a:xfrm>
+          <a:off x="0" y="0"/>
+          <a:ext cx="0" cy="0"/>
+          <a:chOff x="0" y="0"/>
+          <a:chExt cx="0" cy="0"/>
+        </a:xfrm>
+      </p:grpSpPr>
+      <p:sp>
+        <p:nvSpPr>
+          <p:cNvPr id="2" name="Title 1">
+            <a:extLst>
+              <a:ext uri="{FF2B5EF4-FFF2-40B4-BE49-F238E27FC236}">
+                <a16:creationId xmlns:a16="http://schemas.microsoft.com/office/drawing/2014/main" id="{9810EB4D-36EF-401F-8CCF-5B710335F4C8}"/>
+              </a:ext>
+            </a:extLst>
+          </p:cNvPr>
+          <p:cNvSpPr>
+            <a:spLocks noGrp="1"/>
+          </p:cNvSpPr>
+          <p:nvPr>
+            <p:ph type="title"/>
+          </p:nvPr>
+        </p:nvSpPr>
+        <p:spPr/>
+        <p:txBody>
+          <a:bodyPr/>
+          <a:lstStyle/>
+          <a:p>
+            <a:r>
+              <a:rPr lang="en-US"/>
+              <a:t>Utilizing the System from BOM - Labels</a:t>
+            </a:r>
+            <a:endParaRPr lang="en-CA"/>
+          </a:p>
+        </p:txBody>
+      </p:sp>
+      <p:pic>
+        <p:nvPicPr>
+          <p:cNvPr id="4" name="Picture 3">
+            <a:extLst>
+              <a:ext uri="{FF2B5EF4-FFF2-40B4-BE49-F238E27FC236}">
+                <a16:creationId xmlns:a16="http://schemas.microsoft.com/office/drawing/2014/main" id="{7DAD00C7-9D25-4C2E-8691-CA64BBE34D26}"/>
+              </a:ext>
+            </a:extLst>
+          </p:cNvPr>
+          <p:cNvPicPr>
+            <a:picLocks noChangeAspect="1"/>
+          </p:cNvPicPr>
+          <p:nvPr/>
+        </p:nvPicPr>
+        <p:blipFill>
+          <a:blip r:embed="rId2"/>
+          <a:stretch>
+            <a:fillRect/>
+          </a:stretch>
+        </p:blipFill>
+        <p:spPr>
+          <a:xfrm>
+            <a:off x="3869268" y="979577"/>
+            <a:ext cx="7221541" cy="1465911"/>
+          </a:xfrm>
+          <a:prstGeom prst="rect">
+            <a:avLst/>
+          </a:prstGeom>
+        </p:spPr>
+      </p:pic>
+      <p:pic>
+        <p:nvPicPr>
+          <p:cNvPr id="6" name="Picture 5">
+            <a:extLst>
+              <a:ext uri="{FF2B5EF4-FFF2-40B4-BE49-F238E27FC236}">
+                <a16:creationId xmlns:a16="http://schemas.microsoft.com/office/drawing/2014/main" id="{F51E9A52-C1FD-4E0F-B33E-6927ED47DA9B}"/>
+              </a:ext>
+            </a:extLst>
+          </p:cNvPr>
+          <p:cNvPicPr>
+            <a:picLocks noChangeAspect="1"/>
+          </p:cNvPicPr>
+          <p:nvPr/>
+        </p:nvPicPr>
+        <p:blipFill>
+          <a:blip r:embed="rId3"/>
+          <a:stretch>
+            <a:fillRect/>
+          </a:stretch>
+        </p:blipFill>
+        <p:spPr>
+          <a:xfrm>
+            <a:off x="3822281" y="2572333"/>
+            <a:ext cx="7398086" cy="989573"/>
+          </a:xfrm>
+          <a:prstGeom prst="rect">
+            <a:avLst/>
+          </a:prstGeom>
+        </p:spPr>
+      </p:pic>
+      <p:pic>
+        <p:nvPicPr>
+          <p:cNvPr id="7" name="Picture 6">
+            <a:extLst>
+              <a:ext uri="{FF2B5EF4-FFF2-40B4-BE49-F238E27FC236}">
+                <a16:creationId xmlns:a16="http://schemas.microsoft.com/office/drawing/2014/main" id="{D4FCD47C-D41D-481C-9392-C75F5E82A6E0}"/>
+              </a:ext>
+            </a:extLst>
+          </p:cNvPr>
+          <p:cNvPicPr>
+            <a:picLocks noChangeAspect="1"/>
+          </p:cNvPicPr>
+          <p:nvPr/>
+        </p:nvPicPr>
+        <p:blipFill>
+          <a:blip r:embed="rId4"/>
+          <a:stretch>
+            <a:fillRect/>
+          </a:stretch>
+        </p:blipFill>
+        <p:spPr>
+          <a:xfrm>
+            <a:off x="3869267" y="3803046"/>
+            <a:ext cx="7315593" cy="1194255"/>
+          </a:xfrm>
+          <a:prstGeom prst="rect">
+            <a:avLst/>
+          </a:prstGeom>
+        </p:spPr>
+      </p:pic>
+      <p:sp>
+        <p:nvSpPr>
+          <p:cNvPr id="9" name="TextBox 8">
+            <a:extLst>
+              <a:ext uri="{FF2B5EF4-FFF2-40B4-BE49-F238E27FC236}">
+                <a16:creationId xmlns:a16="http://schemas.microsoft.com/office/drawing/2014/main" id="{9FACA037-BFDA-4CF7-96EA-9FB97F5DDE56}"/>
+              </a:ext>
+            </a:extLst>
+          </p:cNvPr>
+          <p:cNvSpPr txBox="1"/>
+          <p:nvPr/>
+        </p:nvSpPr>
+        <p:spPr>
+          <a:xfrm>
+            <a:off x="3822281" y="5878423"/>
+            <a:ext cx="6097772" cy="646331"/>
+          </a:xfrm>
+          <a:prstGeom prst="rect">
+            <a:avLst/>
+          </a:prstGeom>
+          <a:noFill/>
+        </p:spPr>
+        <p:txBody>
+          <a:bodyPr wrap="square">
+            <a:spAutoFit/>
+          </a:bodyPr>
+          <a:lstStyle/>
+          <a:p>
+            <a:r>
+              <a:rPr lang="fr-CA" dirty="0"/>
+              <a:t>Use a ? </a:t>
+            </a:r>
+            <a:r>
+              <a:rPr lang="en-CA" dirty="0"/>
+              <a:t>to</a:t>
+            </a:r>
+            <a:r>
+              <a:rPr lang="fr-CA" dirty="0"/>
+              <a:t> </a:t>
+            </a:r>
+            <a:r>
+              <a:rPr lang="fr-CA" dirty="0" err="1"/>
+              <a:t>include</a:t>
+            </a:r>
+            <a:r>
+              <a:rPr lang="fr-CA" dirty="0"/>
+              <a:t> </a:t>
+            </a:r>
+            <a:r>
+              <a:rPr lang="fr-CA" dirty="0" err="1"/>
+              <a:t>parameters</a:t>
+            </a:r>
+            <a:r>
+              <a:rPr lang="fr-CA" dirty="0"/>
+              <a:t> to the label if applicable </a:t>
+            </a:r>
+            <a:br>
+              <a:rPr lang="fr-CA" dirty="0"/>
+            </a:br>
+            <a:r>
+              <a:rPr lang="fr-CA" dirty="0"/>
+              <a:t>Do not </a:t>
+            </a:r>
+            <a:r>
+              <a:rPr lang="fr-CA" dirty="0" err="1"/>
+              <a:t>exceed</a:t>
+            </a:r>
+            <a:r>
+              <a:rPr lang="fr-CA" dirty="0"/>
+              <a:t> one line</a:t>
+            </a:r>
+          </a:p>
+        </p:txBody>
+      </p:sp>
+    </p:spTree>
+    <p:extLst>
+      <p:ext uri="{BB962C8B-B14F-4D97-AF65-F5344CB8AC3E}">
+        <p14:creationId xmlns:p14="http://schemas.microsoft.com/office/powerpoint/2010/main" val="1533871773"/>
+      </p:ext>
+    </p:extLst>
+  </p:cSld>
+  <p:clrMapOvr>
+    <a:masterClrMapping/>
+  </p:clrMapOvr>
+</p:sld>
+</file>
+
+<file path=ppt/slides/slide12.xml><?xml version="1.0" encoding="utf-8"?>
+<p:sld xmlns:a="http://schemas.openxmlformats.org/drawingml/2006/main" xmlns:r="http://schemas.openxmlformats.org/officeDocument/2006/relationships" xmlns:p="http://schemas.openxmlformats.org/presentationml/2006/main">
+  <p:cSld>
+    <p:spTree>
+      <p:nvGrpSpPr>
+        <p:cNvPr id="1" name=""/>
+        <p:cNvGrpSpPr/>
+        <p:nvPr/>
+      </p:nvGrpSpPr>
+      <p:grpSpPr>
+        <a:xfrm>
+          <a:off x="0" y="0"/>
+          <a:ext cx="0" cy="0"/>
+          <a:chOff x="0" y="0"/>
+          <a:chExt cx="0" cy="0"/>
+        </a:xfrm>
+      </p:grpSpPr>
+      <p:sp>
+        <p:nvSpPr>
+          <p:cNvPr id="2" name="Title 1">
+            <a:extLst>
+              <a:ext uri="{FF2B5EF4-FFF2-40B4-BE49-F238E27FC236}">
+                <a16:creationId xmlns:a16="http://schemas.microsoft.com/office/drawing/2014/main" id="{9810EB4D-36EF-401F-8CCF-5B710335F4C8}"/>
+              </a:ext>
+            </a:extLst>
+          </p:cNvPr>
+          <p:cNvSpPr>
+            <a:spLocks noGrp="1"/>
+          </p:cNvSpPr>
+          <p:nvPr>
+            <p:ph type="title"/>
+          </p:nvPr>
+        </p:nvSpPr>
+        <p:spPr/>
+        <p:txBody>
+          <a:bodyPr/>
+          <a:lstStyle/>
+          <a:p>
+            <a:r>
+              <a:rPr lang="en-US" dirty="0"/>
+              <a:t>Utilizing the System from BOM - Documents</a:t>
+            </a:r>
+            <a:endParaRPr lang="en-CA" dirty="0"/>
+          </a:p>
+        </p:txBody>
+      </p:sp>
+      <p:pic>
+        <p:nvPicPr>
+          <p:cNvPr id="8" name="Picture 7">
+            <a:extLst>
+              <a:ext uri="{FF2B5EF4-FFF2-40B4-BE49-F238E27FC236}">
+                <a16:creationId xmlns:a16="http://schemas.microsoft.com/office/drawing/2014/main" id="{5724BDF6-D0B3-40BE-8696-C288630CAB91}"/>
+              </a:ext>
+            </a:extLst>
+          </p:cNvPr>
+          <p:cNvPicPr>
+            <a:picLocks noChangeAspect="1"/>
+          </p:cNvPicPr>
+          <p:nvPr/>
+        </p:nvPicPr>
+        <p:blipFill>
+          <a:blip r:embed="rId2"/>
+          <a:stretch>
+            <a:fillRect/>
+          </a:stretch>
+        </p:blipFill>
+        <p:spPr>
+          <a:xfrm>
+            <a:off x="3869266" y="904823"/>
+            <a:ext cx="7346309" cy="956747"/>
+          </a:xfrm>
+          <a:prstGeom prst="rect">
+            <a:avLst/>
+          </a:prstGeom>
+        </p:spPr>
+      </p:pic>
+      <p:sp>
+        <p:nvSpPr>
+          <p:cNvPr id="9" name="TextBox 8">
+            <a:extLst>
+              <a:ext uri="{FF2B5EF4-FFF2-40B4-BE49-F238E27FC236}">
+                <a16:creationId xmlns:a16="http://schemas.microsoft.com/office/drawing/2014/main" id="{F2FFAF77-7791-4240-BC78-02EE1B02D3A0}"/>
+              </a:ext>
+            </a:extLst>
+          </p:cNvPr>
+          <p:cNvSpPr txBox="1"/>
+          <p:nvPr/>
+        </p:nvSpPr>
+        <p:spPr>
+          <a:xfrm>
+            <a:off x="5259583" y="2363257"/>
+            <a:ext cx="4828566" cy="923330"/>
+          </a:xfrm>
+          <a:prstGeom prst="rect">
+            <a:avLst/>
+          </a:prstGeom>
+          <a:noFill/>
+        </p:spPr>
+        <p:txBody>
+          <a:bodyPr wrap="none" rtlCol="0">
+            <a:spAutoFit/>
+          </a:bodyPr>
+          <a:lstStyle/>
+          <a:p>
+            <a:pPr marL="285750" indent="-285750">
+              <a:buFont typeface="Arial" panose="020B0604020202020204" pitchFamily="34" charset="0"/>
+              <a:buChar char="•"/>
+            </a:pPr>
+            <a:r>
+              <a:rPr lang="fr-CA" dirty="0"/>
+              <a:t>Use as </a:t>
+            </a:r>
+            <a:r>
+              <a:rPr lang="fr-CA" dirty="0" err="1"/>
+              <a:t>much</a:t>
+            </a:r>
+            <a:r>
+              <a:rPr lang="fr-CA" dirty="0"/>
+              <a:t> </a:t>
+            </a:r>
+            <a:r>
+              <a:rPr lang="en-US" dirty="0"/>
+              <a:t>of</a:t>
+            </a:r>
+            <a:r>
+              <a:rPr lang="fr-CA" dirty="0"/>
+              <a:t> the file </a:t>
+            </a:r>
+            <a:r>
+              <a:rPr lang="fr-CA" dirty="0" err="1"/>
+              <a:t>path</a:t>
+            </a:r>
+            <a:r>
+              <a:rPr lang="fr-CA" dirty="0"/>
+              <a:t> to the document </a:t>
+            </a:r>
+          </a:p>
+          <a:p>
+            <a:pPr marL="285750" indent="-285750">
+              <a:buFont typeface="Arial" panose="020B0604020202020204" pitchFamily="34" charset="0"/>
+              <a:buChar char="•"/>
+            </a:pPr>
+            <a:r>
+              <a:rPr lang="fr-CA" dirty="0" err="1"/>
+              <a:t>Then</a:t>
+            </a:r>
+            <a:r>
+              <a:rPr lang="fr-CA" dirty="0"/>
+              <a:t> a ?</a:t>
+            </a:r>
+          </a:p>
+          <a:p>
+            <a:pPr marL="285750" indent="-285750">
+              <a:buFont typeface="Arial" panose="020B0604020202020204" pitchFamily="34" charset="0"/>
+              <a:buChar char="•"/>
+            </a:pPr>
+            <a:r>
+              <a:rPr lang="fr-CA" dirty="0" err="1"/>
+              <a:t>Then</a:t>
+            </a:r>
+            <a:r>
+              <a:rPr lang="fr-CA" dirty="0"/>
+              <a:t> a unique string to </a:t>
+            </a:r>
+            <a:r>
+              <a:rPr lang="fr-CA" dirty="0" err="1"/>
+              <a:t>identify</a:t>
+            </a:r>
+            <a:r>
+              <a:rPr lang="fr-CA" dirty="0"/>
+              <a:t> the document</a:t>
+            </a:r>
+          </a:p>
+        </p:txBody>
+      </p:sp>
+      <p:sp>
+        <p:nvSpPr>
+          <p:cNvPr id="6" name="TextBox 5">
+            <a:extLst>
+              <a:ext uri="{FF2B5EF4-FFF2-40B4-BE49-F238E27FC236}">
+                <a16:creationId xmlns:a16="http://schemas.microsoft.com/office/drawing/2014/main" id="{653371FE-00BE-411A-9C9F-FD67E34F24CE}"/>
+              </a:ext>
+            </a:extLst>
+          </p:cNvPr>
+          <p:cNvSpPr txBox="1"/>
+          <p:nvPr/>
+        </p:nvSpPr>
+        <p:spPr>
+          <a:xfrm>
+            <a:off x="4654402" y="3945255"/>
+            <a:ext cx="6097772" cy="923330"/>
+          </a:xfrm>
+          <a:prstGeom prst="rect">
+            <a:avLst/>
+          </a:prstGeom>
+          <a:noFill/>
+        </p:spPr>
+        <p:txBody>
+          <a:bodyPr wrap="square">
+            <a:spAutoFit/>
+          </a:bodyPr>
+          <a:lstStyle/>
+          <a:p>
+            <a:r>
+              <a:rPr lang="fr-CA" dirty="0"/>
+              <a:t>Initial DOCS </a:t>
+            </a:r>
+            <a:r>
+              <a:rPr lang="fr-CA" dirty="0" err="1"/>
+              <a:t>is</a:t>
+            </a:r>
+            <a:r>
+              <a:rPr lang="fr-CA" dirty="0"/>
+              <a:t> for the first </a:t>
+            </a:r>
+            <a:r>
+              <a:rPr lang="fr-CA" dirty="0" err="1"/>
+              <a:t>print</a:t>
+            </a:r>
+            <a:r>
+              <a:rPr lang="fr-CA" dirty="0"/>
+              <a:t> cycle, and </a:t>
+            </a:r>
+            <a:r>
+              <a:rPr lang="fr-CA" dirty="0" err="1"/>
+              <a:t>is</a:t>
+            </a:r>
+            <a:r>
+              <a:rPr lang="fr-CA" dirty="0"/>
+              <a:t> </a:t>
+            </a:r>
+            <a:r>
+              <a:rPr lang="fr-CA" dirty="0" err="1"/>
+              <a:t>meant</a:t>
+            </a:r>
+            <a:r>
+              <a:rPr lang="fr-CA" dirty="0"/>
+              <a:t> to </a:t>
+            </a:r>
+            <a:r>
+              <a:rPr lang="fr-CA" dirty="0" err="1"/>
+              <a:t>print</a:t>
+            </a:r>
+            <a:r>
+              <a:rPr lang="fr-CA" dirty="0"/>
+              <a:t> out Word Docs, and </a:t>
+            </a:r>
+            <a:r>
+              <a:rPr lang="fr-CA" dirty="0" err="1"/>
+              <a:t>PDFs</a:t>
+            </a:r>
+            <a:endParaRPr lang="fr-CA" dirty="0"/>
+          </a:p>
+          <a:p>
+            <a:endParaRPr lang="fr-CA" dirty="0"/>
+          </a:p>
+        </p:txBody>
+      </p:sp>
+    </p:spTree>
+    <p:extLst>
+      <p:ext uri="{BB962C8B-B14F-4D97-AF65-F5344CB8AC3E}">
+        <p14:creationId xmlns:p14="http://schemas.microsoft.com/office/powerpoint/2010/main" val="635227077"/>
+      </p:ext>
+    </p:extLst>
+  </p:cSld>
+  <p:clrMapOvr>
+    <a:masterClrMapping/>
+  </p:clrMapOvr>
+</p:sld>
+</file>
+
+<file path=ppt/slides/slide13.xml><?xml version="1.0" encoding="utf-8"?>
+<p:sld xmlns:a="http://schemas.openxmlformats.org/drawingml/2006/main" xmlns:r="http://schemas.openxmlformats.org/officeDocument/2006/relationships" xmlns:p="http://schemas.openxmlformats.org/presentationml/2006/main">
+  <p:cSld>
+    <p:spTree>
+      <p:nvGrpSpPr>
+        <p:cNvPr id="1" name=""/>
+        <p:cNvGrpSpPr/>
+        <p:nvPr/>
+      </p:nvGrpSpPr>
+      <p:grpSpPr>
+        <a:xfrm>
+          <a:off x="0" y="0"/>
+          <a:ext cx="0" cy="0"/>
+          <a:chOff x="0" y="0"/>
+          <a:chExt cx="0" cy="0"/>
+        </a:xfrm>
+      </p:grpSpPr>
+      <p:sp>
+        <p:nvSpPr>
+          <p:cNvPr id="2" name="Title 1">
+            <a:extLst>
+              <a:ext uri="{FF2B5EF4-FFF2-40B4-BE49-F238E27FC236}">
                 <a16:creationId xmlns:a16="http://schemas.microsoft.com/office/drawing/2014/main" id="{5ECB83AA-686B-4E5C-87AA-3DA038C7467E}"/>
               </a:ext>
             </a:extLst>
@@ -21485,7 +22094,7 @@
 </p:sld>
 </file>
 
-<file path=ppt/slides/slide11.xml><?xml version="1.0" encoding="utf-8"?>
+<file path=ppt/slides/slide14.xml><?xml version="1.0" encoding="utf-8"?>
 <p:sld xmlns:a="http://schemas.openxmlformats.org/drawingml/2006/main" xmlns:r="http://schemas.openxmlformats.org/officeDocument/2006/relationships" xmlns:p="http://schemas.openxmlformats.org/presentationml/2006/main">
   <p:cSld>
     <p:spTree>
@@ -21727,7 +22336,7 @@
 </p:sld>
 </file>
 
-<file path=ppt/slides/slide12.xml><?xml version="1.0" encoding="utf-8"?>
+<file path=ppt/slides/slide15.xml><?xml version="1.0" encoding="utf-8"?>
 <p:sld xmlns:a="http://schemas.openxmlformats.org/drawingml/2006/main" xmlns:r="http://schemas.openxmlformats.org/officeDocument/2006/relationships" xmlns:p="http://schemas.openxmlformats.org/presentationml/2006/main">
   <p:cSld>
     <p:spTree>
@@ -21846,7 +22455,7 @@
 </p:sld>
 </file>
 
-<file path=ppt/slides/slide13.xml><?xml version="1.0" encoding="utf-8"?>
+<file path=ppt/slides/slide16.xml><?xml version="1.0" encoding="utf-8"?>
 <p:sld xmlns:a="http://schemas.openxmlformats.org/drawingml/2006/main" xmlns:r="http://schemas.openxmlformats.org/officeDocument/2006/relationships" xmlns:p="http://schemas.openxmlformats.org/presentationml/2006/main">
   <p:cSld>
     <p:spTree>
@@ -21957,7 +22566,7 @@
 </p:sld>
 </file>
 
-<file path=ppt/slides/slide14.xml><?xml version="1.0" encoding="utf-8"?>
+<file path=ppt/slides/slide17.xml><?xml version="1.0" encoding="utf-8"?>
 <p:sld xmlns:a="http://schemas.openxmlformats.org/drawingml/2006/main" xmlns:r="http://schemas.openxmlformats.org/officeDocument/2006/relationships" xmlns:p="http://schemas.openxmlformats.org/presentationml/2006/main">
   <p:cSld>
     <p:spTree>
@@ -22068,7 +22677,7 @@
 </p:sld>
 </file>
 
-<file path=ppt/slides/slide15.xml><?xml version="1.0" encoding="utf-8"?>
+<file path=ppt/slides/slide18.xml><?xml version="1.0" encoding="utf-8"?>
 <p:sld xmlns:a="http://schemas.openxmlformats.org/drawingml/2006/main" xmlns:r="http://schemas.openxmlformats.org/officeDocument/2006/relationships" xmlns:p="http://schemas.openxmlformats.org/presentationml/2006/main">
   <p:cSld>
     <p:spTree>
@@ -22158,7 +22767,7 @@
 </p:sld>
 </file>
 
-<file path=ppt/slides/slide16.xml><?xml version="1.0" encoding="utf-8"?>
+<file path=ppt/slides/slide19.xml><?xml version="1.0" encoding="utf-8"?>
 <p:sld xmlns:a="http://schemas.openxmlformats.org/drawingml/2006/main" xmlns:r="http://schemas.openxmlformats.org/officeDocument/2006/relationships" xmlns:p="http://schemas.openxmlformats.org/presentationml/2006/main">
   <p:cSld>
     <p:spTree>
@@ -22341,601 +22950,6 @@
 </p:sld>
 </file>
 
-<file path=ppt/slides/slide17.xml><?xml version="1.0" encoding="utf-8"?>
-<p:sld xmlns:a="http://schemas.openxmlformats.org/drawingml/2006/main" xmlns:r="http://schemas.openxmlformats.org/officeDocument/2006/relationships" xmlns:p="http://schemas.openxmlformats.org/presentationml/2006/main">
-  <p:cSld>
-    <p:spTree>
-      <p:nvGrpSpPr>
-        <p:cNvPr id="1" name=""/>
-        <p:cNvGrpSpPr/>
-        <p:nvPr/>
-      </p:nvGrpSpPr>
-      <p:grpSpPr>
-        <a:xfrm>
-          <a:off x="0" y="0"/>
-          <a:ext cx="0" cy="0"/>
-          <a:chOff x="0" y="0"/>
-          <a:chExt cx="0" cy="0"/>
-        </a:xfrm>
-      </p:grpSpPr>
-      <p:sp>
-        <p:nvSpPr>
-          <p:cNvPr id="2" name="Title 1">
-            <a:extLst>
-              <a:ext uri="{FF2B5EF4-FFF2-40B4-BE49-F238E27FC236}">
-                <a16:creationId xmlns:a16="http://schemas.microsoft.com/office/drawing/2014/main" id="{5ECB83AA-686B-4E5C-87AA-3DA038C7467E}"/>
-              </a:ext>
-            </a:extLst>
-          </p:cNvPr>
-          <p:cNvSpPr>
-            <a:spLocks noGrp="1"/>
-          </p:cNvSpPr>
-          <p:nvPr>
-            <p:ph type="title"/>
-          </p:nvPr>
-        </p:nvSpPr>
-        <p:spPr/>
-        <p:txBody>
-          <a:bodyPr/>
-          <a:lstStyle/>
-          <a:p>
-            <a:pPr algn="ctr"/>
-            <a:r>
-              <a:rPr lang="en-US"/>
-              <a:t>Technical Debt </a:t>
-            </a:r>
-            <a:r>
-              <a:rPr lang="en-US" err="1"/>
-              <a:t>Cont</a:t>
-            </a:r>
-            <a:r>
-              <a:rPr lang="en-US"/>
-              <a:t>…</a:t>
-            </a:r>
-            <a:endParaRPr lang="fr-CA"/>
-          </a:p>
-        </p:txBody>
-      </p:sp>
-      <p:sp>
-        <p:nvSpPr>
-          <p:cNvPr id="3" name="Content Placeholder 2">
-            <a:extLst>
-              <a:ext uri="{FF2B5EF4-FFF2-40B4-BE49-F238E27FC236}">
-                <a16:creationId xmlns:a16="http://schemas.microsoft.com/office/drawing/2014/main" id="{CAE08BEC-5DC2-4EAA-90C5-75CC8EAD0613}"/>
-              </a:ext>
-            </a:extLst>
-          </p:cNvPr>
-          <p:cNvSpPr>
-            <a:spLocks noGrp="1"/>
-          </p:cNvSpPr>
-          <p:nvPr>
-            <p:ph idx="1"/>
-          </p:nvPr>
-        </p:nvSpPr>
-        <p:spPr/>
-        <p:txBody>
-          <a:bodyPr>
-            <a:normAutofit lnSpcReduction="10000"/>
-          </a:bodyPr>
-          <a:lstStyle/>
-          <a:p>
-            <a:r>
-              <a:rPr lang="en-US" dirty="0"/>
-              <a:t>Location of data and relevant files is hyper dependent on code</a:t>
-            </a:r>
-          </a:p>
-          <a:p>
-            <a:r>
-              <a:rPr lang="en-US" dirty="0"/>
-              <a:t>System will be hard to move between computers</a:t>
-            </a:r>
-          </a:p>
-          <a:p>
-            <a:r>
-              <a:rPr lang="en-US" dirty="0"/>
-              <a:t>Report extract from </a:t>
-            </a:r>
-            <a:r>
-              <a:rPr lang="en-US" dirty="0" err="1"/>
-              <a:t>ExactMAX</a:t>
-            </a:r>
-            <a:r>
-              <a:rPr lang="en-US" dirty="0"/>
-              <a:t> is impossible to work with</a:t>
-            </a:r>
-          </a:p>
-          <a:p>
-            <a:r>
-              <a:rPr lang="en-US" dirty="0"/>
-              <a:t>Crystal reports wont intake a text file easily, serial number is being imported as a parameter from visual cut</a:t>
-            </a:r>
-          </a:p>
-          <a:p>
-            <a:pPr lvl="1"/>
-            <a:r>
-              <a:rPr lang="en-US" dirty="0"/>
-              <a:t>Tried ODBC text file</a:t>
-            </a:r>
-          </a:p>
-          <a:p>
-            <a:r>
-              <a:rPr lang="en-US" dirty="0"/>
-              <a:t>Ensure Microsoft Word is installed</a:t>
-            </a:r>
-          </a:p>
-          <a:p>
-            <a:r>
-              <a:rPr lang="en-US" dirty="0"/>
-              <a:t>Install SQL Server 2019 for SQLCMD.EXE</a:t>
-            </a:r>
-          </a:p>
-          <a:p>
-            <a:r>
-              <a:rPr lang="en-US" dirty="0"/>
-              <a:t>Ensure file paths are updated when downloading from GitHub</a:t>
-            </a:r>
-          </a:p>
-          <a:p>
-            <a:r>
-              <a:rPr lang="en-US" dirty="0"/>
-              <a:t>Don’t change any settings in Visual CUT for specific reports, as it can override the command line parameters</a:t>
-            </a:r>
-          </a:p>
-          <a:p>
-            <a:r>
-              <a:rPr lang="en-US" dirty="0"/>
-              <a:t>Task Schedular files are in \install</a:t>
-            </a:r>
-          </a:p>
-          <a:p>
-            <a:r>
-              <a:rPr lang="en-US" dirty="0"/>
-              <a:t>Set paper printer to default to duplex</a:t>
-            </a:r>
-            <a:endParaRPr lang="en-US" dirty="0">
-              <a:hlinkClick r:id="rId2"/>
-            </a:endParaRPr>
-          </a:p>
-          <a:p>
-            <a:r>
-              <a:rPr lang="en-US" dirty="0">
-                <a:hlinkClick r:id="rId2"/>
-              </a:rPr>
-              <a:t>https://github.com/pixustechnologies/labelSerialNumberProject</a:t>
-            </a:r>
-            <a:endParaRPr lang="fr-CA" dirty="0"/>
-          </a:p>
-        </p:txBody>
-      </p:sp>
-    </p:spTree>
-    <p:extLst>
-      <p:ext uri="{BB962C8B-B14F-4D97-AF65-F5344CB8AC3E}">
-        <p14:creationId xmlns:p14="http://schemas.microsoft.com/office/powerpoint/2010/main" val="2527439539"/>
-      </p:ext>
-    </p:extLst>
-  </p:cSld>
-  <p:clrMapOvr>
-    <a:masterClrMapping/>
-  </p:clrMapOvr>
-</p:sld>
-</file>
-
-<file path=ppt/slides/slide18.xml><?xml version="1.0" encoding="utf-8"?>
-<p:sld xmlns:a="http://schemas.openxmlformats.org/drawingml/2006/main" xmlns:r="http://schemas.openxmlformats.org/officeDocument/2006/relationships" xmlns:p="http://schemas.openxmlformats.org/presentationml/2006/main">
-  <p:cSld>
-    <p:spTree>
-      <p:nvGrpSpPr>
-        <p:cNvPr id="1" name=""/>
-        <p:cNvGrpSpPr/>
-        <p:nvPr/>
-      </p:nvGrpSpPr>
-      <p:grpSpPr>
-        <a:xfrm>
-          <a:off x="0" y="0"/>
-          <a:ext cx="0" cy="0"/>
-          <a:chOff x="0" y="0"/>
-          <a:chExt cx="0" cy="0"/>
-        </a:xfrm>
-      </p:grpSpPr>
-      <p:sp>
-        <p:nvSpPr>
-          <p:cNvPr id="2" name="Title 1">
-            <a:extLst>
-              <a:ext uri="{FF2B5EF4-FFF2-40B4-BE49-F238E27FC236}">
-                <a16:creationId xmlns:a16="http://schemas.microsoft.com/office/drawing/2014/main" id="{9810EB4D-36EF-401F-8CCF-5B710335F4C8}"/>
-              </a:ext>
-            </a:extLst>
-          </p:cNvPr>
-          <p:cNvSpPr>
-            <a:spLocks noGrp="1"/>
-          </p:cNvSpPr>
-          <p:nvPr>
-            <p:ph type="title"/>
-          </p:nvPr>
-        </p:nvSpPr>
-        <p:spPr/>
-        <p:txBody>
-          <a:bodyPr/>
-          <a:lstStyle/>
-          <a:p>
-            <a:r>
-              <a:rPr lang="en-US"/>
-              <a:t>Utilizing the System from BOM - Labels</a:t>
-            </a:r>
-            <a:endParaRPr lang="en-CA"/>
-          </a:p>
-        </p:txBody>
-      </p:sp>
-      <p:pic>
-        <p:nvPicPr>
-          <p:cNvPr id="4" name="Picture 3">
-            <a:extLst>
-              <a:ext uri="{FF2B5EF4-FFF2-40B4-BE49-F238E27FC236}">
-                <a16:creationId xmlns:a16="http://schemas.microsoft.com/office/drawing/2014/main" id="{7DAD00C7-9D25-4C2E-8691-CA64BBE34D26}"/>
-              </a:ext>
-            </a:extLst>
-          </p:cNvPr>
-          <p:cNvPicPr>
-            <a:picLocks noChangeAspect="1"/>
-          </p:cNvPicPr>
-          <p:nvPr/>
-        </p:nvPicPr>
-        <p:blipFill>
-          <a:blip r:embed="rId2"/>
-          <a:stretch>
-            <a:fillRect/>
-          </a:stretch>
-        </p:blipFill>
-        <p:spPr>
-          <a:xfrm>
-            <a:off x="3869268" y="979577"/>
-            <a:ext cx="7221541" cy="1465911"/>
-          </a:xfrm>
-          <a:prstGeom prst="rect">
-            <a:avLst/>
-          </a:prstGeom>
-        </p:spPr>
-      </p:pic>
-      <p:pic>
-        <p:nvPicPr>
-          <p:cNvPr id="6" name="Picture 5">
-            <a:extLst>
-              <a:ext uri="{FF2B5EF4-FFF2-40B4-BE49-F238E27FC236}">
-                <a16:creationId xmlns:a16="http://schemas.microsoft.com/office/drawing/2014/main" id="{F51E9A52-C1FD-4E0F-B33E-6927ED47DA9B}"/>
-              </a:ext>
-            </a:extLst>
-          </p:cNvPr>
-          <p:cNvPicPr>
-            <a:picLocks noChangeAspect="1"/>
-          </p:cNvPicPr>
-          <p:nvPr/>
-        </p:nvPicPr>
-        <p:blipFill>
-          <a:blip r:embed="rId3"/>
-          <a:stretch>
-            <a:fillRect/>
-          </a:stretch>
-        </p:blipFill>
-        <p:spPr>
-          <a:xfrm>
-            <a:off x="3822281" y="2572333"/>
-            <a:ext cx="7398086" cy="989573"/>
-          </a:xfrm>
-          <a:prstGeom prst="rect">
-            <a:avLst/>
-          </a:prstGeom>
-        </p:spPr>
-      </p:pic>
-      <p:pic>
-        <p:nvPicPr>
-          <p:cNvPr id="7" name="Picture 6">
-            <a:extLst>
-              <a:ext uri="{FF2B5EF4-FFF2-40B4-BE49-F238E27FC236}">
-                <a16:creationId xmlns:a16="http://schemas.microsoft.com/office/drawing/2014/main" id="{D4FCD47C-D41D-481C-9392-C75F5E82A6E0}"/>
-              </a:ext>
-            </a:extLst>
-          </p:cNvPr>
-          <p:cNvPicPr>
-            <a:picLocks noChangeAspect="1"/>
-          </p:cNvPicPr>
-          <p:nvPr/>
-        </p:nvPicPr>
-        <p:blipFill>
-          <a:blip r:embed="rId4"/>
-          <a:stretch>
-            <a:fillRect/>
-          </a:stretch>
-        </p:blipFill>
-        <p:spPr>
-          <a:xfrm>
-            <a:off x="3869267" y="3803046"/>
-            <a:ext cx="7315593" cy="1194255"/>
-          </a:xfrm>
-          <a:prstGeom prst="rect">
-            <a:avLst/>
-          </a:prstGeom>
-        </p:spPr>
-      </p:pic>
-      <p:sp>
-        <p:nvSpPr>
-          <p:cNvPr id="9" name="TextBox 8">
-            <a:extLst>
-              <a:ext uri="{FF2B5EF4-FFF2-40B4-BE49-F238E27FC236}">
-                <a16:creationId xmlns:a16="http://schemas.microsoft.com/office/drawing/2014/main" id="{9FACA037-BFDA-4CF7-96EA-9FB97F5DDE56}"/>
-              </a:ext>
-            </a:extLst>
-          </p:cNvPr>
-          <p:cNvSpPr txBox="1"/>
-          <p:nvPr/>
-        </p:nvSpPr>
-        <p:spPr>
-          <a:xfrm>
-            <a:off x="3822281" y="5878423"/>
-            <a:ext cx="6097772" cy="646331"/>
-          </a:xfrm>
-          <a:prstGeom prst="rect">
-            <a:avLst/>
-          </a:prstGeom>
-          <a:noFill/>
-        </p:spPr>
-        <p:txBody>
-          <a:bodyPr wrap="square">
-            <a:spAutoFit/>
-          </a:bodyPr>
-          <a:lstStyle/>
-          <a:p>
-            <a:r>
-              <a:rPr lang="fr-CA" dirty="0"/>
-              <a:t>Use a ? </a:t>
-            </a:r>
-            <a:r>
-              <a:rPr lang="en-CA" dirty="0"/>
-              <a:t>to</a:t>
-            </a:r>
-            <a:r>
-              <a:rPr lang="fr-CA" dirty="0"/>
-              <a:t> </a:t>
-            </a:r>
-            <a:r>
-              <a:rPr lang="fr-CA" dirty="0" err="1"/>
-              <a:t>include</a:t>
-            </a:r>
-            <a:r>
-              <a:rPr lang="fr-CA" dirty="0"/>
-              <a:t> </a:t>
-            </a:r>
-            <a:r>
-              <a:rPr lang="fr-CA" dirty="0" err="1"/>
-              <a:t>parameters</a:t>
-            </a:r>
-            <a:r>
-              <a:rPr lang="fr-CA" dirty="0"/>
-              <a:t> to the label if applicable </a:t>
-            </a:r>
-            <a:br>
-              <a:rPr lang="fr-CA" dirty="0"/>
-            </a:br>
-            <a:r>
-              <a:rPr lang="fr-CA" dirty="0"/>
-              <a:t>Do not </a:t>
-            </a:r>
-            <a:r>
-              <a:rPr lang="fr-CA" dirty="0" err="1"/>
-              <a:t>exceed</a:t>
-            </a:r>
-            <a:r>
-              <a:rPr lang="fr-CA" dirty="0"/>
-              <a:t> one line</a:t>
-            </a:r>
-          </a:p>
-        </p:txBody>
-      </p:sp>
-    </p:spTree>
-    <p:extLst>
-      <p:ext uri="{BB962C8B-B14F-4D97-AF65-F5344CB8AC3E}">
-        <p14:creationId xmlns:p14="http://schemas.microsoft.com/office/powerpoint/2010/main" val="1533871773"/>
-      </p:ext>
-    </p:extLst>
-  </p:cSld>
-  <p:clrMapOvr>
-    <a:masterClrMapping/>
-  </p:clrMapOvr>
-</p:sld>
-</file>
-
-<file path=ppt/slides/slide19.xml><?xml version="1.0" encoding="utf-8"?>
-<p:sld xmlns:a="http://schemas.openxmlformats.org/drawingml/2006/main" xmlns:r="http://schemas.openxmlformats.org/officeDocument/2006/relationships" xmlns:p="http://schemas.openxmlformats.org/presentationml/2006/main">
-  <p:cSld>
-    <p:spTree>
-      <p:nvGrpSpPr>
-        <p:cNvPr id="1" name=""/>
-        <p:cNvGrpSpPr/>
-        <p:nvPr/>
-      </p:nvGrpSpPr>
-      <p:grpSpPr>
-        <a:xfrm>
-          <a:off x="0" y="0"/>
-          <a:ext cx="0" cy="0"/>
-          <a:chOff x="0" y="0"/>
-          <a:chExt cx="0" cy="0"/>
-        </a:xfrm>
-      </p:grpSpPr>
-      <p:sp>
-        <p:nvSpPr>
-          <p:cNvPr id="2" name="Title 1">
-            <a:extLst>
-              <a:ext uri="{FF2B5EF4-FFF2-40B4-BE49-F238E27FC236}">
-                <a16:creationId xmlns:a16="http://schemas.microsoft.com/office/drawing/2014/main" id="{9810EB4D-36EF-401F-8CCF-5B710335F4C8}"/>
-              </a:ext>
-            </a:extLst>
-          </p:cNvPr>
-          <p:cNvSpPr>
-            <a:spLocks noGrp="1"/>
-          </p:cNvSpPr>
-          <p:nvPr>
-            <p:ph type="title"/>
-          </p:nvPr>
-        </p:nvSpPr>
-        <p:spPr/>
-        <p:txBody>
-          <a:bodyPr/>
-          <a:lstStyle/>
-          <a:p>
-            <a:r>
-              <a:rPr lang="en-US" dirty="0"/>
-              <a:t>Utilizing the System from BOM - Documents</a:t>
-            </a:r>
-            <a:endParaRPr lang="en-CA" dirty="0"/>
-          </a:p>
-        </p:txBody>
-      </p:sp>
-      <p:pic>
-        <p:nvPicPr>
-          <p:cNvPr id="8" name="Picture 7">
-            <a:extLst>
-              <a:ext uri="{FF2B5EF4-FFF2-40B4-BE49-F238E27FC236}">
-                <a16:creationId xmlns:a16="http://schemas.microsoft.com/office/drawing/2014/main" id="{5724BDF6-D0B3-40BE-8696-C288630CAB91}"/>
-              </a:ext>
-            </a:extLst>
-          </p:cNvPr>
-          <p:cNvPicPr>
-            <a:picLocks noChangeAspect="1"/>
-          </p:cNvPicPr>
-          <p:nvPr/>
-        </p:nvPicPr>
-        <p:blipFill>
-          <a:blip r:embed="rId2"/>
-          <a:stretch>
-            <a:fillRect/>
-          </a:stretch>
-        </p:blipFill>
-        <p:spPr>
-          <a:xfrm>
-            <a:off x="3869268" y="2733623"/>
-            <a:ext cx="7346309" cy="956747"/>
-          </a:xfrm>
-          <a:prstGeom prst="rect">
-            <a:avLst/>
-          </a:prstGeom>
-        </p:spPr>
-      </p:pic>
-      <p:sp>
-        <p:nvSpPr>
-          <p:cNvPr id="9" name="TextBox 8">
-            <a:extLst>
-              <a:ext uri="{FF2B5EF4-FFF2-40B4-BE49-F238E27FC236}">
-                <a16:creationId xmlns:a16="http://schemas.microsoft.com/office/drawing/2014/main" id="{F2FFAF77-7791-4240-BC78-02EE1B02D3A0}"/>
-              </a:ext>
-            </a:extLst>
-          </p:cNvPr>
-          <p:cNvSpPr txBox="1"/>
-          <p:nvPr/>
-        </p:nvSpPr>
-        <p:spPr>
-          <a:xfrm>
-            <a:off x="5259585" y="4883173"/>
-            <a:ext cx="4565673" cy="1200329"/>
-          </a:xfrm>
-          <a:prstGeom prst="rect">
-            <a:avLst/>
-          </a:prstGeom>
-          <a:noFill/>
-        </p:spPr>
-        <p:txBody>
-          <a:bodyPr wrap="none" rtlCol="0">
-            <a:spAutoFit/>
-          </a:bodyPr>
-          <a:lstStyle/>
-          <a:p>
-            <a:r>
-              <a:rPr lang="fr-CA" dirty="0"/>
-              <a:t>Use as </a:t>
-            </a:r>
-            <a:r>
-              <a:rPr lang="fr-CA" dirty="0" err="1"/>
-              <a:t>much</a:t>
-            </a:r>
-            <a:r>
-              <a:rPr lang="fr-CA" dirty="0"/>
-              <a:t> </a:t>
-            </a:r>
-            <a:r>
-              <a:rPr lang="en-US" dirty="0"/>
-              <a:t>of</a:t>
-            </a:r>
-            <a:r>
-              <a:rPr lang="fr-CA" dirty="0"/>
-              <a:t> the file </a:t>
-            </a:r>
-            <a:r>
-              <a:rPr lang="fr-CA" dirty="0" err="1"/>
-              <a:t>path</a:t>
-            </a:r>
-            <a:r>
-              <a:rPr lang="fr-CA" dirty="0"/>
-              <a:t> to the document, </a:t>
-            </a:r>
-            <a:br>
-              <a:rPr lang="fr-CA" dirty="0"/>
-            </a:br>
-            <a:r>
-              <a:rPr lang="fr-CA" dirty="0" err="1"/>
-              <a:t>Then</a:t>
-            </a:r>
-            <a:r>
-              <a:rPr lang="fr-CA" dirty="0"/>
-              <a:t> a ?, </a:t>
-            </a:r>
-            <a:br>
-              <a:rPr lang="fr-CA" dirty="0"/>
-            </a:br>
-            <a:r>
-              <a:rPr lang="fr-CA" dirty="0" err="1"/>
-              <a:t>Then</a:t>
-            </a:r>
-            <a:r>
-              <a:rPr lang="fr-CA" dirty="0"/>
-              <a:t> a unique string to </a:t>
-            </a:r>
-            <a:r>
-              <a:rPr lang="fr-CA" dirty="0" err="1"/>
-              <a:t>identify</a:t>
-            </a:r>
-            <a:r>
-              <a:rPr lang="fr-CA" dirty="0"/>
-              <a:t> the document</a:t>
-            </a:r>
-            <a:br>
-              <a:rPr lang="fr-CA" dirty="0"/>
-            </a:br>
-            <a:r>
-              <a:rPr lang="fr-CA" dirty="0"/>
-              <a:t>Do not </a:t>
-            </a:r>
-            <a:r>
-              <a:rPr lang="fr-CA" dirty="0" err="1"/>
-              <a:t>exceed</a:t>
-            </a:r>
-            <a:r>
-              <a:rPr lang="fr-CA" dirty="0"/>
-              <a:t> one line</a:t>
-            </a:r>
-          </a:p>
-        </p:txBody>
-      </p:sp>
-    </p:spTree>
-    <p:extLst>
-      <p:ext uri="{BB962C8B-B14F-4D97-AF65-F5344CB8AC3E}">
-        <p14:creationId xmlns:p14="http://schemas.microsoft.com/office/powerpoint/2010/main" val="635227077"/>
-      </p:ext>
-    </p:extLst>
-  </p:cSld>
-  <p:clrMapOvr>
-    <a:masterClrMapping/>
-  </p:clrMapOvr>
-</p:sld>
-</file>
-
 <file path=ppt/slides/slide2.xml><?xml version="1.0" encoding="utf-8"?>
 <p:sld xmlns:a="http://schemas.openxmlformats.org/drawingml/2006/main" xmlns:r="http://schemas.openxmlformats.org/officeDocument/2006/relationships" xmlns:p="http://schemas.openxmlformats.org/presentationml/2006/main">
   <p:cSld>
@@ -23032,6 +23046,17 @@
               <a:t>Follow the instructions on the command prompt window to print the desired documents/labels</a:t>
             </a:r>
           </a:p>
+          <a:p>
+            <a:r>
+              <a:rPr lang="en-CA" dirty="0"/>
+              <a:t>Two additional instructional documents included in Documents\</a:t>
+            </a:r>
+            <a:r>
+              <a:rPr lang="en-CA" dirty="0" err="1"/>
+              <a:t>labelSerialNumberProject</a:t>
+            </a:r>
+            <a:endParaRPr lang="en-CA" dirty="0"/>
+          </a:p>
         </p:txBody>
       </p:sp>
     </p:spTree>
@@ -23048,6 +23073,191 @@
 </file>
 
 <file path=ppt/slides/slide20.xml><?xml version="1.0" encoding="utf-8"?>
+<p:sld xmlns:a="http://schemas.openxmlformats.org/drawingml/2006/main" xmlns:r="http://schemas.openxmlformats.org/officeDocument/2006/relationships" xmlns:p="http://schemas.openxmlformats.org/presentationml/2006/main">
+  <p:cSld>
+    <p:spTree>
+      <p:nvGrpSpPr>
+        <p:cNvPr id="1" name=""/>
+        <p:cNvGrpSpPr/>
+        <p:nvPr/>
+      </p:nvGrpSpPr>
+      <p:grpSpPr>
+        <a:xfrm>
+          <a:off x="0" y="0"/>
+          <a:ext cx="0" cy="0"/>
+          <a:chOff x="0" y="0"/>
+          <a:chExt cx="0" cy="0"/>
+        </a:xfrm>
+      </p:grpSpPr>
+      <p:sp>
+        <p:nvSpPr>
+          <p:cNvPr id="2" name="Title 1">
+            <a:extLst>
+              <a:ext uri="{FF2B5EF4-FFF2-40B4-BE49-F238E27FC236}">
+                <a16:creationId xmlns:a16="http://schemas.microsoft.com/office/drawing/2014/main" id="{5ECB83AA-686B-4E5C-87AA-3DA038C7467E}"/>
+              </a:ext>
+            </a:extLst>
+          </p:cNvPr>
+          <p:cNvSpPr>
+            <a:spLocks noGrp="1"/>
+          </p:cNvSpPr>
+          <p:nvPr>
+            <p:ph type="title"/>
+          </p:nvPr>
+        </p:nvSpPr>
+        <p:spPr/>
+        <p:txBody>
+          <a:bodyPr/>
+          <a:lstStyle/>
+          <a:p>
+            <a:pPr algn="ctr"/>
+            <a:r>
+              <a:rPr lang="en-US"/>
+              <a:t>Technical Debt </a:t>
+            </a:r>
+            <a:r>
+              <a:rPr lang="en-US" err="1"/>
+              <a:t>Cont</a:t>
+            </a:r>
+            <a:r>
+              <a:rPr lang="en-US"/>
+              <a:t>…</a:t>
+            </a:r>
+            <a:endParaRPr lang="fr-CA"/>
+          </a:p>
+        </p:txBody>
+      </p:sp>
+      <p:sp>
+        <p:nvSpPr>
+          <p:cNvPr id="3" name="Content Placeholder 2">
+            <a:extLst>
+              <a:ext uri="{FF2B5EF4-FFF2-40B4-BE49-F238E27FC236}">
+                <a16:creationId xmlns:a16="http://schemas.microsoft.com/office/drawing/2014/main" id="{CAE08BEC-5DC2-4EAA-90C5-75CC8EAD0613}"/>
+              </a:ext>
+            </a:extLst>
+          </p:cNvPr>
+          <p:cNvSpPr>
+            <a:spLocks noGrp="1"/>
+          </p:cNvSpPr>
+          <p:nvPr>
+            <p:ph idx="1"/>
+          </p:nvPr>
+        </p:nvSpPr>
+        <p:spPr/>
+        <p:txBody>
+          <a:bodyPr>
+            <a:normAutofit fontScale="92500" lnSpcReduction="20000"/>
+          </a:bodyPr>
+          <a:lstStyle/>
+          <a:p>
+            <a:r>
+              <a:rPr lang="en-US" dirty="0"/>
+              <a:t>Location of data and relevant files is hyper dependent on code</a:t>
+            </a:r>
+          </a:p>
+          <a:p>
+            <a:r>
+              <a:rPr lang="en-US" dirty="0"/>
+              <a:t>System will be hard to move between computers</a:t>
+            </a:r>
+          </a:p>
+          <a:p>
+            <a:r>
+              <a:rPr lang="en-US" dirty="0"/>
+              <a:t>Report extract from </a:t>
+            </a:r>
+            <a:r>
+              <a:rPr lang="en-US" dirty="0" err="1"/>
+              <a:t>ExactMAX</a:t>
+            </a:r>
+            <a:r>
+              <a:rPr lang="en-US" dirty="0"/>
+              <a:t> is impossible to work with</a:t>
+            </a:r>
+          </a:p>
+          <a:p>
+            <a:r>
+              <a:rPr lang="en-US" dirty="0"/>
+              <a:t>Crystal reports wont intake a text file easily, serial number is being imported as a parameter from visual cut</a:t>
+            </a:r>
+          </a:p>
+          <a:p>
+            <a:pPr lvl="1"/>
+            <a:r>
+              <a:rPr lang="en-US" dirty="0"/>
+              <a:t>Tried ODBC text file</a:t>
+            </a:r>
+          </a:p>
+          <a:p>
+            <a:r>
+              <a:rPr lang="en-US" dirty="0"/>
+              <a:t>Ensure Microsoft Word is installed</a:t>
+            </a:r>
+          </a:p>
+          <a:p>
+            <a:r>
+              <a:rPr lang="en-US" dirty="0"/>
+              <a:t>Install SQL Server 2019 for SQLCMD.EXE</a:t>
+            </a:r>
+          </a:p>
+          <a:p>
+            <a:r>
+              <a:rPr lang="en-US" dirty="0"/>
+              <a:t>Ensure file paths are updated when downloading from GitHub</a:t>
+            </a:r>
+          </a:p>
+          <a:p>
+            <a:r>
+              <a:rPr lang="en-US" dirty="0"/>
+              <a:t>Don’t change any settings in Visual CUT for specific reports, as it can override the command line parameters</a:t>
+            </a:r>
+          </a:p>
+          <a:p>
+            <a:r>
+              <a:rPr lang="en-US" dirty="0"/>
+              <a:t>Task Schedular files are in \install</a:t>
+            </a:r>
+          </a:p>
+          <a:p>
+            <a:r>
+              <a:rPr lang="en-US" dirty="0"/>
+              <a:t>Place the correct password into updateSQL.bat</a:t>
+            </a:r>
+          </a:p>
+          <a:p>
+            <a:r>
+              <a:rPr lang="en-US" dirty="0"/>
+              <a:t>Set paper printer to default to duplex</a:t>
+            </a:r>
+            <a:endParaRPr lang="en-US" dirty="0">
+              <a:hlinkClick r:id="rId2"/>
+            </a:endParaRPr>
+          </a:p>
+          <a:p>
+            <a:r>
+              <a:rPr lang="en-US" dirty="0">
+                <a:hlinkClick r:id="rId2"/>
+              </a:rPr>
+              <a:t>https://github.com/pixustechnologies/labelSerialNumberProject</a:t>
+            </a:r>
+            <a:endParaRPr lang="fr-CA" dirty="0"/>
+          </a:p>
+        </p:txBody>
+      </p:sp>
+    </p:spTree>
+    <p:extLst>
+      <p:ext uri="{BB962C8B-B14F-4D97-AF65-F5344CB8AC3E}">
+        <p14:creationId xmlns:p14="http://schemas.microsoft.com/office/powerpoint/2010/main" val="2527439539"/>
+      </p:ext>
+    </p:extLst>
+  </p:cSld>
+  <p:clrMapOvr>
+    <a:masterClrMapping/>
+  </p:clrMapOvr>
+</p:sld>
+</file>
+
+<file path=ppt/slides/slide21.xml><?xml version="1.0" encoding="utf-8"?>
 <p:sld xmlns:a="http://schemas.openxmlformats.org/drawingml/2006/main" xmlns:r="http://schemas.openxmlformats.org/officeDocument/2006/relationships" xmlns:p="http://schemas.openxmlformats.org/presentationml/2006/main">
   <p:cSld>
     <p:spTree>
@@ -23135,7 +23345,7 @@
 </p:sld>
 </file>
 
-<file path=ppt/slides/slide21.xml><?xml version="1.0" encoding="utf-8"?>
+<file path=ppt/slides/slide22.xml><?xml version="1.0" encoding="utf-8"?>
 <p:sld xmlns:a="http://schemas.openxmlformats.org/drawingml/2006/main" xmlns:r="http://schemas.openxmlformats.org/officeDocument/2006/relationships" xmlns:p="http://schemas.openxmlformats.org/presentationml/2006/main">
   <p:cSld>
     <p:spTree>
@@ -23911,6 +24121,122 @@
           <p:cNvPr id="2" name="Title 1">
             <a:extLst>
               <a:ext uri="{FF2B5EF4-FFF2-40B4-BE49-F238E27FC236}">
+                <a16:creationId xmlns:a16="http://schemas.microsoft.com/office/drawing/2014/main" id="{C3623DCE-1290-4291-85EE-1D0AABEF8554}"/>
+              </a:ext>
+            </a:extLst>
+          </p:cNvPr>
+          <p:cNvSpPr>
+            <a:spLocks noGrp="1"/>
+          </p:cNvSpPr>
+          <p:nvPr>
+            <p:ph type="title"/>
+          </p:nvPr>
+        </p:nvSpPr>
+        <p:spPr/>
+        <p:txBody>
+          <a:bodyPr/>
+          <a:lstStyle/>
+          <a:p>
+            <a:r>
+              <a:rPr lang="en-CA" dirty="0"/>
+              <a:t>First Screen</a:t>
+            </a:r>
+          </a:p>
+        </p:txBody>
+      </p:sp>
+      <p:sp>
+        <p:nvSpPr>
+          <p:cNvPr id="4" name="Text Placeholder 3">
+            <a:extLst>
+              <a:ext uri="{FF2B5EF4-FFF2-40B4-BE49-F238E27FC236}">
+                <a16:creationId xmlns:a16="http://schemas.microsoft.com/office/drawing/2014/main" id="{7641421E-92AE-4DA4-8DF4-7B4DA6F3A901}"/>
+              </a:ext>
+            </a:extLst>
+          </p:cNvPr>
+          <p:cNvSpPr>
+            <a:spLocks noGrp="1"/>
+          </p:cNvSpPr>
+          <p:nvPr>
+            <p:ph type="body" sz="half" idx="2"/>
+          </p:nvPr>
+        </p:nvSpPr>
+        <p:spPr/>
+        <p:txBody>
+          <a:bodyPr/>
+          <a:lstStyle/>
+          <a:p>
+            <a:r>
+              <a:rPr lang="en-CA" dirty="0"/>
+              <a:t>At this stage, you can edit the data pulled from the database before the system parses through it</a:t>
+            </a:r>
+          </a:p>
+        </p:txBody>
+      </p:sp>
+      <p:pic>
+        <p:nvPicPr>
+          <p:cNvPr id="6" name="Picture 5">
+            <a:extLst>
+              <a:ext uri="{FF2B5EF4-FFF2-40B4-BE49-F238E27FC236}">
+                <a16:creationId xmlns:a16="http://schemas.microsoft.com/office/drawing/2014/main" id="{66F45837-6854-4379-951F-54F47F62DCE0}"/>
+              </a:ext>
+            </a:extLst>
+          </p:cNvPr>
+          <p:cNvPicPr>
+            <a:picLocks noChangeAspect="1"/>
+          </p:cNvPicPr>
+          <p:nvPr/>
+        </p:nvPicPr>
+        <p:blipFill>
+          <a:blip r:embed="rId2"/>
+          <a:stretch>
+            <a:fillRect/>
+          </a:stretch>
+        </p:blipFill>
+        <p:spPr>
+          <a:xfrm>
+            <a:off x="3570643" y="1305146"/>
+            <a:ext cx="8113783" cy="4247707"/>
+          </a:xfrm>
+          <a:prstGeom prst="rect">
+            <a:avLst/>
+          </a:prstGeom>
+        </p:spPr>
+      </p:pic>
+    </p:spTree>
+    <p:extLst>
+      <p:ext uri="{BB962C8B-B14F-4D97-AF65-F5344CB8AC3E}">
+        <p14:creationId xmlns:p14="http://schemas.microsoft.com/office/powerpoint/2010/main" val="2209782722"/>
+      </p:ext>
+    </p:extLst>
+  </p:cSld>
+  <p:clrMapOvr>
+    <a:masterClrMapping/>
+  </p:clrMapOvr>
+</p:sld>
+</file>
+
+<file path=ppt/slides/slide9.xml><?xml version="1.0" encoding="utf-8"?>
+<p:sld xmlns:a="http://schemas.openxmlformats.org/drawingml/2006/main" xmlns:r="http://schemas.openxmlformats.org/officeDocument/2006/relationships" xmlns:p="http://schemas.openxmlformats.org/presentationml/2006/main">
+  <p:cSld>
+    <p:spTree>
+      <p:nvGrpSpPr>
+        <p:cNvPr id="1" name=""/>
+        <p:cNvGrpSpPr/>
+        <p:nvPr/>
+      </p:nvGrpSpPr>
+      <p:grpSpPr>
+        <a:xfrm>
+          <a:off x="0" y="0"/>
+          <a:ext cx="0" cy="0"/>
+          <a:chOff x="0" y="0"/>
+          <a:chExt cx="0" cy="0"/>
+        </a:xfrm>
+      </p:grpSpPr>
+      <p:sp>
+        <p:nvSpPr>
+          <p:cNvPr id="2" name="Title 1">
+            <a:extLst>
+              <a:ext uri="{FF2B5EF4-FFF2-40B4-BE49-F238E27FC236}">
                 <a16:creationId xmlns:a16="http://schemas.microsoft.com/office/drawing/2014/main" id="{61179D2D-801C-4EE8-A452-FEEBAB97827A}"/>
               </a:ext>
             </a:extLst>
@@ -23962,10 +24288,10 @@
       </p:sp>
       <p:pic>
         <p:nvPicPr>
-          <p:cNvPr id="5" name="Picture 4">
+          <p:cNvPr id="6" name="Picture 5">
             <a:extLst>
               <a:ext uri="{FF2B5EF4-FFF2-40B4-BE49-F238E27FC236}">
-                <a16:creationId xmlns:a16="http://schemas.microsoft.com/office/drawing/2014/main" id="{CA9833E8-6340-4BCD-98B8-C8B935B355EB}"/>
+                <a16:creationId xmlns:a16="http://schemas.microsoft.com/office/drawing/2014/main" id="{1DE11077-D880-4A09-9198-0003E8A39A4F}"/>
               </a:ext>
             </a:extLst>
           </p:cNvPr>
@@ -23982,8 +24308,8 @@
         </p:blipFill>
         <p:spPr>
           <a:xfrm>
-            <a:off x="3531341" y="1381711"/>
-            <a:ext cx="8228457" cy="4277458"/>
+            <a:off x="3561907" y="1270798"/>
+            <a:ext cx="8238116" cy="4316403"/>
           </a:xfrm>
           <a:prstGeom prst="rect">
             <a:avLst/>
@@ -23994,120 +24320,6 @@
     <p:extLst>
       <p:ext uri="{BB962C8B-B14F-4D97-AF65-F5344CB8AC3E}">
         <p14:creationId xmlns:p14="http://schemas.microsoft.com/office/powerpoint/2010/main" val="1880720997"/>
-      </p:ext>
-    </p:extLst>
-  </p:cSld>
-  <p:clrMapOvr>
-    <a:masterClrMapping/>
-  </p:clrMapOvr>
-</p:sld>
-</file>
-
-<file path=ppt/slides/slide9.xml><?xml version="1.0" encoding="utf-8"?>
-<p:sld xmlns:a="http://schemas.openxmlformats.org/drawingml/2006/main" xmlns:r="http://schemas.openxmlformats.org/officeDocument/2006/relationships" xmlns:p="http://schemas.openxmlformats.org/presentationml/2006/main">
-  <p:cSld>
-    <p:spTree>
-      <p:nvGrpSpPr>
-        <p:cNvPr id="1" name=""/>
-        <p:cNvGrpSpPr/>
-        <p:nvPr/>
-      </p:nvGrpSpPr>
-      <p:grpSpPr>
-        <a:xfrm>
-          <a:off x="0" y="0"/>
-          <a:ext cx="0" cy="0"/>
-          <a:chOff x="0" y="0"/>
-          <a:chExt cx="0" cy="0"/>
-        </a:xfrm>
-      </p:grpSpPr>
-      <p:sp>
-        <p:nvSpPr>
-          <p:cNvPr id="2" name="Title 1">
-            <a:extLst>
-              <a:ext uri="{FF2B5EF4-FFF2-40B4-BE49-F238E27FC236}">
-                <a16:creationId xmlns:a16="http://schemas.microsoft.com/office/drawing/2014/main" id="{61179D2D-801C-4EE8-A452-FEEBAB97827A}"/>
-              </a:ext>
-            </a:extLst>
-          </p:cNvPr>
-          <p:cNvSpPr>
-            <a:spLocks noGrp="1"/>
-          </p:cNvSpPr>
-          <p:nvPr>
-            <p:ph type="title"/>
-          </p:nvPr>
-        </p:nvSpPr>
-        <p:spPr/>
-        <p:txBody>
-          <a:bodyPr/>
-          <a:lstStyle/>
-          <a:p>
-            <a:r>
-              <a:rPr lang="en-US"/>
-              <a:t>Post Printing Stage 2</a:t>
-            </a:r>
-            <a:endParaRPr lang="fr-CA"/>
-          </a:p>
-        </p:txBody>
-      </p:sp>
-      <p:sp>
-        <p:nvSpPr>
-          <p:cNvPr id="4" name="Text Placeholder 3">
-            <a:extLst>
-              <a:ext uri="{FF2B5EF4-FFF2-40B4-BE49-F238E27FC236}">
-                <a16:creationId xmlns:a16="http://schemas.microsoft.com/office/drawing/2014/main" id="{6C4C9579-17E8-4B90-A0AC-8E6A0551F6C7}"/>
-              </a:ext>
-            </a:extLst>
-          </p:cNvPr>
-          <p:cNvSpPr>
-            <a:spLocks noGrp="1"/>
-          </p:cNvSpPr>
-          <p:nvPr>
-            <p:ph type="body" sz="half" idx="2"/>
-          </p:nvPr>
-        </p:nvSpPr>
-        <p:spPr/>
-        <p:txBody>
-          <a:bodyPr/>
-          <a:lstStyle/>
-          <a:p>
-            <a:endParaRPr lang="fr-CA"/>
-          </a:p>
-        </p:txBody>
-      </p:sp>
-      <p:pic>
-        <p:nvPicPr>
-          <p:cNvPr id="7" name="Picture 6">
-            <a:extLst>
-              <a:ext uri="{FF2B5EF4-FFF2-40B4-BE49-F238E27FC236}">
-                <a16:creationId xmlns:a16="http://schemas.microsoft.com/office/drawing/2014/main" id="{12065F72-E859-4CC5-B874-43111899779C}"/>
-              </a:ext>
-            </a:extLst>
-          </p:cNvPr>
-          <p:cNvPicPr>
-            <a:picLocks noChangeAspect="1"/>
-          </p:cNvPicPr>
-          <p:nvPr/>
-        </p:nvPicPr>
-        <p:blipFill>
-          <a:blip r:embed="rId2"/>
-          <a:stretch>
-            <a:fillRect/>
-          </a:stretch>
-        </p:blipFill>
-        <p:spPr>
-          <a:xfrm>
-            <a:off x="3579199" y="1316168"/>
-            <a:ext cx="8079931" cy="4225663"/>
-          </a:xfrm>
-          <a:prstGeom prst="rect">
-            <a:avLst/>
-          </a:prstGeom>
-        </p:spPr>
-      </p:pic>
-    </p:spTree>
-    <p:extLst>
-      <p:ext uri="{BB962C8B-B14F-4D97-AF65-F5344CB8AC3E}">
-        <p14:creationId xmlns:p14="http://schemas.microsoft.com/office/powerpoint/2010/main" val="4089766087"/>
       </p:ext>
     </p:extLst>
   </p:cSld>

</xml_diff>

<commit_message>
Note Exit Char + Excel Support Note exit character is tilde In Initial DOCS, you can now print the first sheet of the excel
</commit_message>
<xml_diff>
--- a/LabelSerialNumberOverview.pptx
+++ b/LabelSerialNumberOverview.pptx
@@ -18208,7 +18208,7 @@
             <a:fld id="{5586B75A-687E-405C-8A0B-8D00578BA2C3}" type="datetimeFigureOut">
               <a:rPr lang="en-US"/>
               <a:pPr/>
-              <a:t>10/26/2021</a:t>
+              <a:t>10/27/2021</a:t>
             </a:fld>
             <a:endParaRPr lang="en-US"/>
           </a:p>
@@ -18375,7 +18375,7 @@
             <a:fld id="{5586B75A-687E-405C-8A0B-8D00578BA2C3}" type="datetimeFigureOut">
               <a:rPr lang="en-US"/>
               <a:pPr/>
-              <a:t>10/26/2021</a:t>
+              <a:t>10/27/2021</a:t>
             </a:fld>
             <a:endParaRPr lang="en-US"/>
           </a:p>
@@ -18552,7 +18552,7 @@
             <a:fld id="{5586B75A-687E-405C-8A0B-8D00578BA2C3}" type="datetimeFigureOut">
               <a:rPr lang="en-US"/>
               <a:pPr/>
-              <a:t>10/26/2021</a:t>
+              <a:t>10/27/2021</a:t>
             </a:fld>
             <a:endParaRPr lang="en-US"/>
           </a:p>
@@ -18719,7 +18719,7 @@
             <a:fld id="{5586B75A-687E-405C-8A0B-8D00578BA2C3}" type="datetimeFigureOut">
               <a:rPr lang="en-US"/>
               <a:pPr/>
-              <a:t>10/26/2021</a:t>
+              <a:t>10/27/2021</a:t>
             </a:fld>
             <a:endParaRPr lang="en-US"/>
           </a:p>
@@ -18974,7 +18974,7 @@
             <a:fld id="{5586B75A-687E-405C-8A0B-8D00578BA2C3}" type="datetimeFigureOut">
               <a:rPr lang="en-US"/>
               <a:pPr/>
-              <a:t>10/26/2021</a:t>
+              <a:t>10/27/2021</a:t>
             </a:fld>
             <a:endParaRPr lang="en-US"/>
           </a:p>
@@ -19259,7 +19259,7 @@
             <a:fld id="{5586B75A-687E-405C-8A0B-8D00578BA2C3}" type="datetimeFigureOut">
               <a:rPr lang="en-US"/>
               <a:pPr/>
-              <a:t>10/26/2021</a:t>
+              <a:t>10/27/2021</a:t>
             </a:fld>
             <a:endParaRPr lang="en-US"/>
           </a:p>
@@ -19698,7 +19698,7 @@
             <a:fld id="{5586B75A-687E-405C-8A0B-8D00578BA2C3}" type="datetimeFigureOut">
               <a:rPr lang="en-US"/>
               <a:pPr/>
-              <a:t>10/26/2021</a:t>
+              <a:t>10/27/2021</a:t>
             </a:fld>
             <a:endParaRPr lang="en-US"/>
           </a:p>
@@ -19813,7 +19813,7 @@
             <a:fld id="{5586B75A-687E-405C-8A0B-8D00578BA2C3}" type="datetimeFigureOut">
               <a:rPr lang="en-US"/>
               <a:pPr/>
-              <a:t>10/26/2021</a:t>
+              <a:t>10/27/2021</a:t>
             </a:fld>
             <a:endParaRPr lang="en-US"/>
           </a:p>
@@ -19905,7 +19905,7 @@
             <a:fld id="{5586B75A-687E-405C-8A0B-8D00578BA2C3}" type="datetimeFigureOut">
               <a:rPr lang="en-US"/>
               <a:pPr/>
-              <a:t>10/26/2021</a:t>
+              <a:t>10/27/2021</a:t>
             </a:fld>
             <a:endParaRPr lang="en-US"/>
           </a:p>
@@ -20190,7 +20190,7 @@
             <a:fld id="{5586B75A-687E-405C-8A0B-8D00578BA2C3}" type="datetimeFigureOut">
               <a:rPr lang="en-US"/>
               <a:pPr/>
-              <a:t>10/26/2021</a:t>
+              <a:t>10/27/2021</a:t>
             </a:fld>
             <a:endParaRPr lang="en-US"/>
           </a:p>
@@ -20459,7 +20459,7 @@
             <a:fld id="{5586B75A-687E-405C-8A0B-8D00578BA2C3}" type="datetimeFigureOut">
               <a:rPr lang="en-US"/>
               <a:pPr/>
-              <a:t>10/26/2021</a:t>
+              <a:t>10/27/2021</a:t>
             </a:fld>
             <a:endParaRPr lang="en-US"/>
           </a:p>
@@ -20753,7 +20753,7 @@
             <a:fld id="{5586B75A-687E-405C-8A0B-8D00578BA2C3}" type="datetimeFigureOut">
               <a:rPr lang="en-US"/>
               <a:pPr/>
-              <a:t>10/26/2021</a:t>
+              <a:t>10/27/2021</a:t>
             </a:fld>
             <a:endParaRPr lang="en-US"/>
           </a:p>
@@ -21481,36 +21481,6 @@
       </p:sp>
       <p:pic>
         <p:nvPicPr>
-          <p:cNvPr id="4" name="Picture 3">
-            <a:extLst>
-              <a:ext uri="{FF2B5EF4-FFF2-40B4-BE49-F238E27FC236}">
-                <a16:creationId xmlns:a16="http://schemas.microsoft.com/office/drawing/2014/main" id="{7DAD00C7-9D25-4C2E-8691-CA64BBE34D26}"/>
-              </a:ext>
-            </a:extLst>
-          </p:cNvPr>
-          <p:cNvPicPr>
-            <a:picLocks noChangeAspect="1"/>
-          </p:cNvPicPr>
-          <p:nvPr/>
-        </p:nvPicPr>
-        <p:blipFill>
-          <a:blip r:embed="rId2"/>
-          <a:stretch>
-            <a:fillRect/>
-          </a:stretch>
-        </p:blipFill>
-        <p:spPr>
-          <a:xfrm>
-            <a:off x="3869268" y="979577"/>
-            <a:ext cx="7221541" cy="1465911"/>
-          </a:xfrm>
-          <a:prstGeom prst="rect">
-            <a:avLst/>
-          </a:prstGeom>
-        </p:spPr>
-      </p:pic>
-      <p:pic>
-        <p:nvPicPr>
           <p:cNvPr id="6" name="Picture 5">
             <a:extLst>
               <a:ext uri="{FF2B5EF4-FFF2-40B4-BE49-F238E27FC236}">
@@ -21524,7 +21494,7 @@
           <p:nvPr/>
         </p:nvPicPr>
         <p:blipFill>
-          <a:blip r:embed="rId3"/>
+          <a:blip r:embed="rId2"/>
           <a:stretch>
             <a:fillRect/>
           </a:stretch>
@@ -21554,7 +21524,7 @@
           <p:nvPr/>
         </p:nvPicPr>
         <p:blipFill>
-          <a:blip r:embed="rId4"/>
+          <a:blip r:embed="rId3"/>
           <a:stretch>
             <a:fillRect/>
           </a:stretch>
@@ -21643,6 +21613,36 @@
           </a:p>
         </p:txBody>
       </p:sp>
+      <p:pic>
+        <p:nvPicPr>
+          <p:cNvPr id="8" name="Picture 7">
+            <a:extLst>
+              <a:ext uri="{FF2B5EF4-FFF2-40B4-BE49-F238E27FC236}">
+                <a16:creationId xmlns:a16="http://schemas.microsoft.com/office/drawing/2014/main" id="{67896677-D7E0-4937-BCEC-894F9CC04661}"/>
+              </a:ext>
+            </a:extLst>
+          </p:cNvPr>
+          <p:cNvPicPr>
+            <a:picLocks noChangeAspect="1"/>
+          </p:cNvPicPr>
+          <p:nvPr/>
+        </p:nvPicPr>
+        <p:blipFill>
+          <a:blip r:embed="rId4"/>
+          <a:stretch>
+            <a:fillRect/>
+          </a:stretch>
+        </p:blipFill>
+        <p:spPr>
+          <a:xfrm>
+            <a:off x="3869267" y="918664"/>
+            <a:ext cx="7315593" cy="1043410"/>
+          </a:xfrm>
+          <a:prstGeom prst="rect">
+            <a:avLst/>
+          </a:prstGeom>
+        </p:spPr>
+      </p:pic>
     </p:spTree>
     <p:extLst>
       <p:ext uri="{BB962C8B-B14F-4D97-AF65-F5344CB8AC3E}">
@@ -21746,8 +21746,8 @@
         </p:nvSpPr>
         <p:spPr>
           <a:xfrm>
-            <a:off x="5259583" y="2363257"/>
-            <a:ext cx="4828566" cy="923330"/>
+            <a:off x="3869265" y="2033244"/>
+            <a:ext cx="7231125" cy="1200329"/>
           </a:xfrm>
           <a:prstGeom prst="rect">
             <a:avLst/>
@@ -21755,10 +21755,24 @@
           <a:noFill/>
         </p:spPr>
         <p:txBody>
-          <a:bodyPr wrap="none" rtlCol="0">
+          <a:bodyPr wrap="square" rtlCol="0">
             <a:spAutoFit/>
           </a:bodyPr>
           <a:lstStyle/>
+          <a:p>
+            <a:r>
+              <a:rPr lang="fr-CA" dirty="0"/>
+              <a:t>The correct </a:t>
+            </a:r>
+            <a:r>
+              <a:rPr lang="fr-CA" dirty="0" err="1"/>
+              <a:t>formatting</a:t>
+            </a:r>
+            <a:r>
+              <a:rPr lang="fr-CA" dirty="0"/>
+              <a:t>:</a:t>
+            </a:r>
+          </a:p>
           <a:p>
             <a:pPr marL="285750" indent="-285750">
               <a:buFont typeface="Arial" panose="020B0604020202020204" pitchFamily="34" charset="0"/>
@@ -21766,7 +21780,7 @@
             </a:pPr>
             <a:r>
               <a:rPr lang="fr-CA" dirty="0"/>
-              <a:t>Use as </a:t>
+              <a:t>As </a:t>
             </a:r>
             <a:r>
               <a:rPr lang="fr-CA" dirty="0" err="1"/>
@@ -21799,12 +21813,8 @@
               <a:buChar char="•"/>
             </a:pPr>
             <a:r>
-              <a:rPr lang="fr-CA" dirty="0" err="1"/>
-              <a:t>Then</a:t>
-            </a:r>
-            <a:r>
               <a:rPr lang="fr-CA" dirty="0"/>
-              <a:t> a ?</a:t>
+              <a:t>?</a:t>
             </a:r>
           </a:p>
           <a:p>
@@ -21813,12 +21823,8 @@
               <a:buChar char="•"/>
             </a:pPr>
             <a:r>
-              <a:rPr lang="fr-CA" dirty="0" err="1"/>
-              <a:t>Then</a:t>
-            </a:r>
-            <a:r>
               <a:rPr lang="fr-CA" dirty="0"/>
-              <a:t> a unique string to </a:t>
+              <a:t>An unique string to </a:t>
             </a:r>
             <a:r>
               <a:rPr lang="fr-CA" dirty="0" err="1"/>
@@ -21845,8 +21851,8 @@
         </p:nvSpPr>
         <p:spPr>
           <a:xfrm>
-            <a:off x="4654402" y="3945255"/>
-            <a:ext cx="6097772" cy="923330"/>
+            <a:off x="3894074" y="3624427"/>
+            <a:ext cx="7206316" cy="1754326"/>
           </a:xfrm>
           <a:prstGeom prst="rect">
             <a:avLst/>
@@ -21859,6 +21865,10 @@
           </a:bodyPr>
           <a:lstStyle/>
           <a:p>
+            <a:pPr marL="285750" indent="-285750">
+              <a:buFont typeface="Arial" panose="020B0604020202020204" pitchFamily="34" charset="0"/>
+              <a:buChar char="•"/>
+            </a:pPr>
             <a:r>
               <a:rPr lang="fr-CA" dirty="0"/>
               <a:t>Initial DOCS </a:t>
@@ -21881,7 +21891,71 @@
             </a:r>
             <a:r>
               <a:rPr lang="fr-CA" dirty="0" err="1"/>
+              <a:t>handles</a:t>
+            </a:r>
+            <a:r>
+              <a:rPr lang="fr-CA" dirty="0"/>
+              <a:t> Word Docs, </a:t>
+            </a:r>
+            <a:r>
+              <a:rPr lang="fr-CA" dirty="0" err="1"/>
+              <a:t>PDFs</a:t>
+            </a:r>
+            <a:r>
+              <a:rPr lang="fr-CA" dirty="0"/>
+              <a:t>, and the first </a:t>
+            </a:r>
+            <a:r>
+              <a:rPr lang="fr-CA" dirty="0" err="1"/>
+              <a:t>sheet</a:t>
+            </a:r>
+            <a:r>
+              <a:rPr lang="fr-CA" dirty="0"/>
+              <a:t> of an Excel file.</a:t>
+            </a:r>
+          </a:p>
+          <a:p>
+            <a:pPr marL="285750" indent="-285750">
+              <a:buFont typeface="Arial" panose="020B0604020202020204" pitchFamily="34" charset="0"/>
+              <a:buChar char="•"/>
+            </a:pPr>
+            <a:r>
+              <a:rPr lang="fr-CA" dirty="0"/>
+              <a:t>Final DOCS </a:t>
+            </a:r>
+            <a:r>
+              <a:rPr lang="fr-CA" dirty="0" err="1"/>
               <a:t>is</a:t>
+            </a:r>
+            <a:r>
+              <a:rPr lang="fr-CA" dirty="0"/>
+              <a:t> for the second </a:t>
+            </a:r>
+            <a:r>
+              <a:rPr lang="fr-CA" dirty="0" err="1"/>
+              <a:t>print</a:t>
+            </a:r>
+            <a:r>
+              <a:rPr lang="fr-CA" dirty="0"/>
+              <a:t> cycle, and </a:t>
+            </a:r>
+            <a:r>
+              <a:rPr lang="fr-CA" dirty="0" err="1"/>
+              <a:t>handles</a:t>
+            </a:r>
+            <a:r>
+              <a:rPr lang="fr-CA" dirty="0"/>
+              <a:t> Crystal Reports. </a:t>
+            </a:r>
+          </a:p>
+          <a:p>
+            <a:pPr marL="742950" lvl="1" indent="-285750">
+              <a:buFont typeface="Arial" panose="020B0604020202020204" pitchFamily="34" charset="0"/>
+              <a:buChar char="•"/>
+            </a:pPr>
+            <a:r>
+              <a:rPr lang="fr-CA" dirty="0" err="1"/>
+              <a:t>It’s</a:t>
             </a:r>
             <a:r>
               <a:rPr lang="fr-CA" dirty="0"/>
@@ -21889,7 +21963,7 @@
             </a:r>
             <a:r>
               <a:rPr lang="fr-CA" dirty="0" err="1"/>
-              <a:t>meant</a:t>
+              <a:t>defaulted</a:t>
             </a:r>
             <a:r>
               <a:rPr lang="fr-CA" dirty="0"/>
@@ -21897,17 +21971,36 @@
             </a:r>
             <a:r>
               <a:rPr lang="fr-CA" dirty="0" err="1"/>
-              <a:t>print</a:t>
+              <a:t>only</a:t>
             </a:r>
             <a:r>
               <a:rPr lang="fr-CA" dirty="0"/>
-              <a:t> out Word Docs, and </a:t>
+              <a:t> </a:t>
             </a:r>
             <a:r>
               <a:rPr lang="fr-CA" dirty="0" err="1"/>
-              <a:t>PDFs</a:t>
+              <a:t>send</a:t>
             </a:r>
-            <a:endParaRPr lang="fr-CA" dirty="0"/>
+            <a:r>
+              <a:rPr lang="fr-CA" dirty="0"/>
+              <a:t> the shop </a:t>
+            </a:r>
+            <a:r>
+              <a:rPr lang="fr-CA" dirty="0" err="1"/>
+              <a:t>order</a:t>
+            </a:r>
+            <a:r>
+              <a:rPr lang="fr-CA" dirty="0"/>
+              <a:t> in parm1, and the serial </a:t>
+            </a:r>
+            <a:r>
+              <a:rPr lang="fr-CA" dirty="0" err="1"/>
+              <a:t>number</a:t>
+            </a:r>
+            <a:r>
+              <a:rPr lang="fr-CA" dirty="0"/>
+              <a:t> in parm2.</a:t>
+            </a:r>
           </a:p>
           <a:p>
             <a:endParaRPr lang="fr-CA" dirty="0"/>

</xml_diff>

<commit_message>
Added functionality for special QA sheets Also moved to central location
</commit_message>
<xml_diff>
--- a/LabelSerialNumberOverview.pptx
+++ b/LabelSerialNumberOverview.pptx
@@ -22111,7 +22111,15 @@
             <a:pPr lvl="1"/>
             <a:r>
               <a:rPr lang="en-US" dirty="0"/>
-              <a:t>Go to Documents\</a:t>
+              <a:t>Go to </a:t>
+            </a:r>
+            <a:r>
+              <a:rPr lang="en-CA" dirty="0"/>
+              <a:t>Custom Programs</a:t>
+            </a:r>
+            <a:r>
+              <a:rPr lang="en-US" dirty="0"/>
+              <a:t>\</a:t>
             </a:r>
             <a:r>
               <a:rPr lang="en-US" dirty="0" err="1"/>
@@ -22153,7 +22161,15 @@
             <a:pPr lvl="1"/>
             <a:r>
               <a:rPr lang="en-US" dirty="0"/>
-              <a:t>Go to Documents\</a:t>
+              <a:t>Go to </a:t>
+            </a:r>
+            <a:r>
+              <a:rPr lang="en-CA" dirty="0"/>
+              <a:t>Custom Programs</a:t>
+            </a:r>
+            <a:r>
+              <a:rPr lang="en-US" dirty="0"/>
+              <a:t>\</a:t>
             </a:r>
             <a:r>
               <a:rPr lang="en-US" dirty="0" err="1"/>
@@ -22395,7 +22411,7 @@
         <p:spPr>
           <a:xfrm>
             <a:off x="2409583" y="6350466"/>
-            <a:ext cx="7819577" cy="369332"/>
+            <a:ext cx="6466835" cy="369332"/>
           </a:xfrm>
           <a:prstGeom prst="rect">
             <a:avLst/>
@@ -22409,10 +22425,26 @@
           <a:lstStyle/>
           <a:p>
             <a:r>
-              <a:rPr lang="en-US"/>
-              <a:t>*C:\Users\PXSPRNADM\Documents\labelSerialNumberProject\scanningProcess</a:t>
+              <a:rPr lang="en-US" dirty="0"/>
+              <a:t>*C:\</a:t>
             </a:r>
-            <a:endParaRPr lang="fr-CA"/>
+            <a:r>
+              <a:rPr lang="en-CA" dirty="0"/>
+              <a:t>Custom Programs</a:t>
+            </a:r>
+            <a:r>
+              <a:rPr lang="en-US" dirty="0"/>
+              <a:t>\</a:t>
+            </a:r>
+            <a:r>
+              <a:rPr lang="en-US" dirty="0" err="1"/>
+              <a:t>labelSerialNumberProject</a:t>
+            </a:r>
+            <a:r>
+              <a:rPr lang="en-US" dirty="0"/>
+              <a:t>\scanningProcess</a:t>
+            </a:r>
+            <a:endParaRPr lang="fr-CA" dirty="0"/>
           </a:p>
         </p:txBody>
       </p:sp>
@@ -23142,7 +23174,7 @@
           <a:p>
             <a:r>
               <a:rPr lang="en-CA" dirty="0"/>
-              <a:t>Two additional instructional documents included in Documents\</a:t>
+              <a:t>Two additional instructional documents included in Custom Programs\</a:t>
             </a:r>
             <a:r>
               <a:rPr lang="en-CA" dirty="0" err="1"/>

</xml_diff>